<commit_message>
layout profile e painel de pesquisa
</commit_message>
<xml_diff>
--- a/Prototipo.pptx
+++ b/Prototipo.pptx
@@ -117,6 +117,7 @@
 <file path=ppt/revisionInfo.xml><?xml version="1.0" encoding="utf-8"?>
 <p1510:revInfo xmlns:a="http://schemas.openxmlformats.org/drawingml/2006/main" xmlns:r="http://schemas.openxmlformats.org/officeDocument/2006/relationships" xmlns:p1510="http://schemas.microsoft.com/office/powerpoint/2015/10/main">
   <p1510:revLst>
+    <p1510:client id="{76F43D00-1EDB-41F2-B935-87E7A99C1490}" v="10" dt="2022-08-03T23:36:32.978"/>
     <p1510:client id="{93EC2668-CA84-47F4-98E3-D4A811018B9E}" v="5" dt="2022-08-03T00:48:55.867"/>
   </p1510:revLst>
 </p1510:revInfo>
@@ -440,6 +441,405 @@
       </pc:sldChg>
     </pc:docChg>
   </pc:docChgLst>
+  <pc:docChgLst>
+    <pc:chgData name="Henrique Cambraia" userId="1615583aa607cfb6" providerId="LiveId" clId="{76F43D00-1EDB-41F2-B935-87E7A99C1490}"/>
+    <pc:docChg chg="undo custSel modSld">
+      <pc:chgData name="Henrique Cambraia" userId="1615583aa607cfb6" providerId="LiveId" clId="{76F43D00-1EDB-41F2-B935-87E7A99C1490}" dt="2022-08-03T23:37:09.625" v="107" actId="1076"/>
+      <pc:docMkLst>
+        <pc:docMk/>
+      </pc:docMkLst>
+      <pc:sldChg chg="addSp delSp modSp mod">
+        <pc:chgData name="Henrique Cambraia" userId="1615583aa607cfb6" providerId="LiveId" clId="{76F43D00-1EDB-41F2-B935-87E7A99C1490}" dt="2022-08-03T23:37:09.625" v="107" actId="1076"/>
+        <pc:sldMkLst>
+          <pc:docMk/>
+          <pc:sldMk cId="2686754018" sldId="257"/>
+        </pc:sldMkLst>
+        <pc:spChg chg="del">
+          <ac:chgData name="Henrique Cambraia" userId="1615583aa607cfb6" providerId="LiveId" clId="{76F43D00-1EDB-41F2-B935-87E7A99C1490}" dt="2022-08-03T23:31:35.350" v="10" actId="478"/>
+          <ac:spMkLst>
+            <pc:docMk/>
+            <pc:sldMk cId="2686754018" sldId="257"/>
+            <ac:spMk id="7" creationId="{B95AFAFF-702C-65A8-8236-263B52FB0E06}"/>
+          </ac:spMkLst>
+        </pc:spChg>
+        <pc:spChg chg="del">
+          <ac:chgData name="Henrique Cambraia" userId="1615583aa607cfb6" providerId="LiveId" clId="{76F43D00-1EDB-41F2-B935-87E7A99C1490}" dt="2022-08-03T23:33:49.356" v="39" actId="478"/>
+          <ac:spMkLst>
+            <pc:docMk/>
+            <pc:sldMk cId="2686754018" sldId="257"/>
+            <ac:spMk id="9" creationId="{9BCD9B27-E647-F593-EB4D-E74C2BAC908A}"/>
+          </ac:spMkLst>
+        </pc:spChg>
+        <pc:spChg chg="del">
+          <ac:chgData name="Henrique Cambraia" userId="1615583aa607cfb6" providerId="LiveId" clId="{76F43D00-1EDB-41F2-B935-87E7A99C1490}" dt="2022-08-03T23:33:50.074" v="40" actId="478"/>
+          <ac:spMkLst>
+            <pc:docMk/>
+            <pc:sldMk cId="2686754018" sldId="257"/>
+            <ac:spMk id="10" creationId="{9E49CC9D-5B39-E0C8-650C-8E1D7F17833C}"/>
+          </ac:spMkLst>
+        </pc:spChg>
+        <pc:spChg chg="del">
+          <ac:chgData name="Henrique Cambraia" userId="1615583aa607cfb6" providerId="LiveId" clId="{76F43D00-1EDB-41F2-B935-87E7A99C1490}" dt="2022-08-03T23:30:37.224" v="0" actId="478"/>
+          <ac:spMkLst>
+            <pc:docMk/>
+            <pc:sldMk cId="2686754018" sldId="257"/>
+            <ac:spMk id="11" creationId="{14036E0E-F847-D122-6FB4-C202F9EA8C73}"/>
+          </ac:spMkLst>
+        </pc:spChg>
+        <pc:spChg chg="mod">
+          <ac:chgData name="Henrique Cambraia" userId="1615583aa607cfb6" providerId="LiveId" clId="{76F43D00-1EDB-41F2-B935-87E7A99C1490}" dt="2022-08-03T23:36:17.321" v="79" actId="14100"/>
+          <ac:spMkLst>
+            <pc:docMk/>
+            <pc:sldMk cId="2686754018" sldId="257"/>
+            <ac:spMk id="13" creationId="{7CE4DFB2-9AB4-012B-7B38-FB56A5D82A9C}"/>
+          </ac:spMkLst>
+        </pc:spChg>
+        <pc:spChg chg="del">
+          <ac:chgData name="Henrique Cambraia" userId="1615583aa607cfb6" providerId="LiveId" clId="{76F43D00-1EDB-41F2-B935-87E7A99C1490}" dt="2022-08-03T23:31:37.589" v="13" actId="478"/>
+          <ac:spMkLst>
+            <pc:docMk/>
+            <pc:sldMk cId="2686754018" sldId="257"/>
+            <ac:spMk id="17" creationId="{B852A2E4-B857-4ECD-F99E-C81053476EF5}"/>
+          </ac:spMkLst>
+        </pc:spChg>
+        <pc:spChg chg="add mod">
+          <ac:chgData name="Henrique Cambraia" userId="1615583aa607cfb6" providerId="LiveId" clId="{76F43D00-1EDB-41F2-B935-87E7A99C1490}" dt="2022-08-03T23:36:25.913" v="84" actId="1076"/>
+          <ac:spMkLst>
+            <pc:docMk/>
+            <pc:sldMk cId="2686754018" sldId="257"/>
+            <ac:spMk id="27" creationId="{AA2E6CC0-9BE9-BC7A-707F-9FDD6ADE188B}"/>
+          </ac:spMkLst>
+        </pc:spChg>
+        <pc:spChg chg="add mod">
+          <ac:chgData name="Henrique Cambraia" userId="1615583aa607cfb6" providerId="LiveId" clId="{76F43D00-1EDB-41F2-B935-87E7A99C1490}" dt="2022-08-03T23:34:40.690" v="54" actId="14100"/>
+          <ac:spMkLst>
+            <pc:docMk/>
+            <pc:sldMk cId="2686754018" sldId="257"/>
+            <ac:spMk id="28" creationId="{4DA13376-9E47-D239-0820-0D0F39448339}"/>
+          </ac:spMkLst>
+        </pc:spChg>
+        <pc:spChg chg="add mod">
+          <ac:chgData name="Henrique Cambraia" userId="1615583aa607cfb6" providerId="LiveId" clId="{76F43D00-1EDB-41F2-B935-87E7A99C1490}" dt="2022-08-03T23:34:45.755" v="57" actId="1076"/>
+          <ac:spMkLst>
+            <pc:docMk/>
+            <pc:sldMk cId="2686754018" sldId="257"/>
+            <ac:spMk id="29" creationId="{51E92512-D413-2966-698A-74373C22CE6B}"/>
+          </ac:spMkLst>
+        </pc:spChg>
+        <pc:spChg chg="add del mod">
+          <ac:chgData name="Henrique Cambraia" userId="1615583aa607cfb6" providerId="LiveId" clId="{76F43D00-1EDB-41F2-B935-87E7A99C1490}" dt="2022-08-03T23:34:48.507" v="59" actId="478"/>
+          <ac:spMkLst>
+            <pc:docMk/>
+            <pc:sldMk cId="2686754018" sldId="257"/>
+            <ac:spMk id="30" creationId="{F8940A47-1BAD-9310-540C-A526575D976B}"/>
+          </ac:spMkLst>
+        </pc:spChg>
+        <pc:spChg chg="del">
+          <ac:chgData name="Henrique Cambraia" userId="1615583aa607cfb6" providerId="LiveId" clId="{76F43D00-1EDB-41F2-B935-87E7A99C1490}" dt="2022-08-03T23:30:40.391" v="1" actId="478"/>
+          <ac:spMkLst>
+            <pc:docMk/>
+            <pc:sldMk cId="2686754018" sldId="257"/>
+            <ac:spMk id="35" creationId="{98030798-2852-BFD1-2091-616D19C8A300}"/>
+          </ac:spMkLst>
+        </pc:spChg>
+        <pc:spChg chg="add mod">
+          <ac:chgData name="Henrique Cambraia" userId="1615583aa607cfb6" providerId="LiveId" clId="{76F43D00-1EDB-41F2-B935-87E7A99C1490}" dt="2022-08-03T23:35:01.089" v="62" actId="14100"/>
+          <ac:spMkLst>
+            <pc:docMk/>
+            <pc:sldMk cId="2686754018" sldId="257"/>
+            <ac:spMk id="38" creationId="{5BC0E9D3-830F-E0B9-152A-3A52B2873BD3}"/>
+          </ac:spMkLst>
+        </pc:spChg>
+        <pc:spChg chg="add del mod">
+          <ac:chgData name="Henrique Cambraia" userId="1615583aa607cfb6" providerId="LiveId" clId="{76F43D00-1EDB-41F2-B935-87E7A99C1490}" dt="2022-08-03T23:35:46.939" v="72" actId="478"/>
+          <ac:spMkLst>
+            <pc:docMk/>
+            <pc:sldMk cId="2686754018" sldId="257"/>
+            <ac:spMk id="39" creationId="{641C2482-A188-8E7F-FDFD-43B6181878F1}"/>
+          </ac:spMkLst>
+        </pc:spChg>
+        <pc:spChg chg="add mod">
+          <ac:chgData name="Henrique Cambraia" userId="1615583aa607cfb6" providerId="LiveId" clId="{76F43D00-1EDB-41F2-B935-87E7A99C1490}" dt="2022-08-03T23:35:05.703" v="64"/>
+          <ac:spMkLst>
+            <pc:docMk/>
+            <pc:sldMk cId="2686754018" sldId="257"/>
+            <ac:spMk id="40" creationId="{B59EE45D-0379-32BF-94B0-4B7F37553CF1}"/>
+          </ac:spMkLst>
+        </pc:spChg>
+        <pc:spChg chg="add mod">
+          <ac:chgData name="Henrique Cambraia" userId="1615583aa607cfb6" providerId="LiveId" clId="{76F43D00-1EDB-41F2-B935-87E7A99C1490}" dt="2022-08-03T23:35:05.703" v="64"/>
+          <ac:spMkLst>
+            <pc:docMk/>
+            <pc:sldMk cId="2686754018" sldId="257"/>
+            <ac:spMk id="41" creationId="{D06BC804-8FAA-E9AD-012B-52C0C8043FA3}"/>
+          </ac:spMkLst>
+        </pc:spChg>
+        <pc:spChg chg="add mod">
+          <ac:chgData name="Henrique Cambraia" userId="1615583aa607cfb6" providerId="LiveId" clId="{76F43D00-1EDB-41F2-B935-87E7A99C1490}" dt="2022-08-03T23:35:49.384" v="73" actId="14100"/>
+          <ac:spMkLst>
+            <pc:docMk/>
+            <pc:sldMk cId="2686754018" sldId="257"/>
+            <ac:spMk id="42" creationId="{031617E3-8E05-59E9-2753-6163C129D69D}"/>
+          </ac:spMkLst>
+        </pc:spChg>
+        <pc:spChg chg="add del mod">
+          <ac:chgData name="Henrique Cambraia" userId="1615583aa607cfb6" providerId="LiveId" clId="{76F43D00-1EDB-41F2-B935-87E7A99C1490}" dt="2022-08-03T23:35:43.859" v="71" actId="478"/>
+          <ac:spMkLst>
+            <pc:docMk/>
+            <pc:sldMk cId="2686754018" sldId="257"/>
+            <ac:spMk id="43" creationId="{2499D226-4212-CC26-41E1-3532947AC124}"/>
+          </ac:spMkLst>
+        </pc:spChg>
+        <pc:spChg chg="add mod">
+          <ac:chgData name="Henrique Cambraia" userId="1615583aa607cfb6" providerId="LiveId" clId="{76F43D00-1EDB-41F2-B935-87E7A99C1490}" dt="2022-08-03T23:36:50.817" v="101" actId="14100"/>
+          <ac:spMkLst>
+            <pc:docMk/>
+            <pc:sldMk cId="2686754018" sldId="257"/>
+            <ac:spMk id="45" creationId="{DBC505A3-4B03-169C-289D-D31285CD337A}"/>
+          </ac:spMkLst>
+        </pc:spChg>
+        <pc:spChg chg="add mod">
+          <ac:chgData name="Henrique Cambraia" userId="1615583aa607cfb6" providerId="LiveId" clId="{76F43D00-1EDB-41F2-B935-87E7A99C1490}" dt="2022-08-03T23:37:09.625" v="107" actId="1076"/>
+          <ac:spMkLst>
+            <pc:docMk/>
+            <pc:sldMk cId="2686754018" sldId="257"/>
+            <ac:spMk id="49" creationId="{4F78B913-53C6-AC06-A8AF-57AFCCAAB0C0}"/>
+          </ac:spMkLst>
+        </pc:spChg>
+        <pc:grpChg chg="add del">
+          <ac:chgData name="Henrique Cambraia" userId="1615583aa607cfb6" providerId="LiveId" clId="{76F43D00-1EDB-41F2-B935-87E7A99C1490}" dt="2022-08-03T23:31:36.533" v="11" actId="478"/>
+          <ac:grpSpMkLst>
+            <pc:docMk/>
+            <pc:sldMk cId="2686754018" sldId="257"/>
+            <ac:grpSpMk id="26" creationId="{8FF5C318-CDB9-5DFE-30CD-C910B4CFE71A}"/>
+          </ac:grpSpMkLst>
+        </pc:grpChg>
+        <pc:grpChg chg="del">
+          <ac:chgData name="Henrique Cambraia" userId="1615583aa607cfb6" providerId="LiveId" clId="{76F43D00-1EDB-41F2-B935-87E7A99C1490}" dt="2022-08-03T23:30:40.391" v="1" actId="478"/>
+          <ac:grpSpMkLst>
+            <pc:docMk/>
+            <pc:sldMk cId="2686754018" sldId="257"/>
+            <ac:grpSpMk id="31" creationId="{9731C1E3-C638-3CFC-AFAA-2E906DA34C81}"/>
+          </ac:grpSpMkLst>
+        </pc:grpChg>
+        <pc:picChg chg="del">
+          <ac:chgData name="Henrique Cambraia" userId="1615583aa607cfb6" providerId="LiveId" clId="{76F43D00-1EDB-41F2-B935-87E7A99C1490}" dt="2022-08-03T23:31:38.603" v="14" actId="478"/>
+          <ac:picMkLst>
+            <pc:docMk/>
+            <pc:sldMk cId="2686754018" sldId="257"/>
+            <ac:picMk id="3" creationId="{A54EDF3D-2D17-FEC8-E9C8-3F1243EEA83E}"/>
+          </ac:picMkLst>
+        </pc:picChg>
+        <pc:picChg chg="add del mod">
+          <ac:chgData name="Henrique Cambraia" userId="1615583aa607cfb6" providerId="LiveId" clId="{76F43D00-1EDB-41F2-B935-87E7A99C1490}" dt="2022-08-03T23:31:33.790" v="8" actId="478"/>
+          <ac:picMkLst>
+            <pc:docMk/>
+            <pc:sldMk cId="2686754018" sldId="257"/>
+            <ac:picMk id="4" creationId="{B0D3F932-CDAA-0549-680D-E3EF235E5758}"/>
+          </ac:picMkLst>
+        </pc:picChg>
+        <pc:picChg chg="add mod">
+          <ac:chgData name="Henrique Cambraia" userId="1615583aa607cfb6" providerId="LiveId" clId="{76F43D00-1EDB-41F2-B935-87E7A99C1490}" dt="2022-08-03T23:31:44.420" v="17" actId="1076"/>
+          <ac:picMkLst>
+            <pc:docMk/>
+            <pc:sldMk cId="2686754018" sldId="257"/>
+            <ac:picMk id="8" creationId="{2F3E67DB-6671-B94B-BF43-2C18B188E2D3}"/>
+          </ac:picMkLst>
+        </pc:picChg>
+        <pc:picChg chg="add del mod">
+          <ac:chgData name="Henrique Cambraia" userId="1615583aa607cfb6" providerId="LiveId" clId="{76F43D00-1EDB-41F2-B935-87E7A99C1490}" dt="2022-08-03T23:34:42.579" v="55" actId="478"/>
+          <ac:picMkLst>
+            <pc:docMk/>
+            <pc:sldMk cId="2686754018" sldId="257"/>
+            <ac:picMk id="14" creationId="{CC1D74F1-0F53-8564-4854-37F6D732FA31}"/>
+          </ac:picMkLst>
+        </pc:picChg>
+        <pc:picChg chg="add mod">
+          <ac:chgData name="Henrique Cambraia" userId="1615583aa607cfb6" providerId="LiveId" clId="{76F43D00-1EDB-41F2-B935-87E7A99C1490}" dt="2022-08-03T23:35:26.808" v="68" actId="1076"/>
+          <ac:picMkLst>
+            <pc:docMk/>
+            <pc:sldMk cId="2686754018" sldId="257"/>
+            <ac:picMk id="16" creationId="{93174367-AFF2-19B5-CD93-0171FCBF931A}"/>
+          </ac:picMkLst>
+        </pc:picChg>
+        <pc:picChg chg="add del">
+          <ac:chgData name="Henrique Cambraia" userId="1615583aa607cfb6" providerId="LiveId" clId="{76F43D00-1EDB-41F2-B935-87E7A99C1490}" dt="2022-08-03T23:31:36.950" v="12" actId="478"/>
+          <ac:picMkLst>
+            <pc:docMk/>
+            <pc:sldMk cId="2686754018" sldId="257"/>
+            <ac:picMk id="19" creationId="{5ABB23BD-D746-7A22-9E58-FFA9FCC035EA}"/>
+          </ac:picMkLst>
+        </pc:picChg>
+        <pc:picChg chg="add mod">
+          <ac:chgData name="Henrique Cambraia" userId="1615583aa607cfb6" providerId="LiveId" clId="{76F43D00-1EDB-41F2-B935-87E7A99C1490}" dt="2022-08-03T23:35:51.370" v="74" actId="1076"/>
+          <ac:picMkLst>
+            <pc:docMk/>
+            <pc:sldMk cId="2686754018" sldId="257"/>
+            <ac:picMk id="20" creationId="{9E44B425-AADA-0ADE-4CBD-AFDF0817A707}"/>
+          </ac:picMkLst>
+        </pc:picChg>
+        <pc:picChg chg="add mod">
+          <ac:chgData name="Henrique Cambraia" userId="1615583aa607cfb6" providerId="LiveId" clId="{76F43D00-1EDB-41F2-B935-87E7A99C1490}" dt="2022-08-03T23:36:13.618" v="78" actId="1076"/>
+          <ac:picMkLst>
+            <pc:docMk/>
+            <pc:sldMk cId="2686754018" sldId="257"/>
+            <ac:picMk id="22" creationId="{3663F33D-3BF8-53F5-DDC4-1B5C4AD36887}"/>
+          </ac:picMkLst>
+        </pc:picChg>
+        <pc:picChg chg="del">
+          <ac:chgData name="Henrique Cambraia" userId="1615583aa607cfb6" providerId="LiveId" clId="{76F43D00-1EDB-41F2-B935-87E7A99C1490}" dt="2022-08-03T23:31:39.219" v="15" actId="478"/>
+          <ac:picMkLst>
+            <pc:docMk/>
+            <pc:sldMk cId="2686754018" sldId="257"/>
+            <ac:picMk id="24" creationId="{9980DD59-5D39-4E0C-1EC2-3B28103B4DF0}"/>
+          </ac:picMkLst>
+        </pc:picChg>
+        <pc:picChg chg="add mod">
+          <ac:chgData name="Henrique Cambraia" userId="1615583aa607cfb6" providerId="LiveId" clId="{76F43D00-1EDB-41F2-B935-87E7A99C1490}" dt="2022-08-03T23:36:23.529" v="83" actId="1076"/>
+          <ac:picMkLst>
+            <pc:docMk/>
+            <pc:sldMk cId="2686754018" sldId="257"/>
+            <ac:picMk id="25" creationId="{DC9E7ADB-7AF1-C728-677A-5728A8433956}"/>
+          </ac:picMkLst>
+        </pc:picChg>
+        <pc:picChg chg="del">
+          <ac:chgData name="Henrique Cambraia" userId="1615583aa607cfb6" providerId="LiveId" clId="{76F43D00-1EDB-41F2-B935-87E7A99C1490}" dt="2022-08-03T23:31:34.524" v="9" actId="478"/>
+          <ac:picMkLst>
+            <pc:docMk/>
+            <pc:sldMk cId="2686754018" sldId="257"/>
+            <ac:picMk id="37" creationId="{6094182B-C294-C364-C530-A80A3829746D}"/>
+          </ac:picMkLst>
+        </pc:picChg>
+        <pc:picChg chg="add del mod">
+          <ac:chgData name="Henrique Cambraia" userId="1615583aa607cfb6" providerId="LiveId" clId="{76F43D00-1EDB-41F2-B935-87E7A99C1490}" dt="2022-08-03T23:36:29.357" v="86" actId="478"/>
+          <ac:picMkLst>
+            <pc:docMk/>
+            <pc:sldMk cId="2686754018" sldId="257"/>
+            <ac:picMk id="44" creationId="{72CF315A-6B28-6100-49A1-9A35DDCD0A7A}"/>
+          </ac:picMkLst>
+        </pc:picChg>
+        <pc:picChg chg="add mod">
+          <ac:chgData name="Henrique Cambraia" userId="1615583aa607cfb6" providerId="LiveId" clId="{76F43D00-1EDB-41F2-B935-87E7A99C1490}" dt="2022-08-03T23:36:45.770" v="100" actId="1035"/>
+          <ac:picMkLst>
+            <pc:docMk/>
+            <pc:sldMk cId="2686754018" sldId="257"/>
+            <ac:picMk id="46" creationId="{7387A20E-AA8D-DAD8-75F8-4FAFA1922042}"/>
+          </ac:picMkLst>
+        </pc:picChg>
+        <pc:picChg chg="add mod">
+          <ac:chgData name="Henrique Cambraia" userId="1615583aa607cfb6" providerId="LiveId" clId="{76F43D00-1EDB-41F2-B935-87E7A99C1490}" dt="2022-08-03T23:36:43.827" v="93" actId="1035"/>
+          <ac:picMkLst>
+            <pc:docMk/>
+            <pc:sldMk cId="2686754018" sldId="257"/>
+            <ac:picMk id="47" creationId="{B4831BFA-AEBE-4AEA-9C2A-E585D160E49B}"/>
+          </ac:picMkLst>
+        </pc:picChg>
+      </pc:sldChg>
+      <pc:sldChg chg="addSp delSp modSp mod">
+        <pc:chgData name="Henrique Cambraia" userId="1615583aa607cfb6" providerId="LiveId" clId="{76F43D00-1EDB-41F2-B935-87E7A99C1490}" dt="2022-08-03T23:33:23.644" v="38" actId="1076"/>
+        <pc:sldMkLst>
+          <pc:docMk/>
+          <pc:sldMk cId="3009845630" sldId="260"/>
+        </pc:sldMkLst>
+        <pc:spChg chg="del">
+          <ac:chgData name="Henrique Cambraia" userId="1615583aa607cfb6" providerId="LiveId" clId="{76F43D00-1EDB-41F2-B935-87E7A99C1490}" dt="2022-08-03T23:31:48.021" v="18" actId="478"/>
+          <ac:spMkLst>
+            <pc:docMk/>
+            <pc:sldMk cId="3009845630" sldId="260"/>
+            <ac:spMk id="7" creationId="{B95AFAFF-702C-65A8-8236-263B52FB0E06}"/>
+          </ac:spMkLst>
+        </pc:spChg>
+        <pc:spChg chg="mod">
+          <ac:chgData name="Henrique Cambraia" userId="1615583aa607cfb6" providerId="LiveId" clId="{76F43D00-1EDB-41F2-B935-87E7A99C1490}" dt="2022-08-03T23:33:10.531" v="35" actId="207"/>
+          <ac:spMkLst>
+            <pc:docMk/>
+            <pc:sldMk cId="3009845630" sldId="260"/>
+            <ac:spMk id="10" creationId="{9E49CC9D-5B39-E0C8-650C-8E1D7F17833C}"/>
+          </ac:spMkLst>
+        </pc:spChg>
+        <pc:spChg chg="del">
+          <ac:chgData name="Henrique Cambraia" userId="1615583aa607cfb6" providerId="LiveId" clId="{76F43D00-1EDB-41F2-B935-87E7A99C1490}" dt="2022-08-03T23:31:48.021" v="18" actId="478"/>
+          <ac:spMkLst>
+            <pc:docMk/>
+            <pc:sldMk cId="3009845630" sldId="260"/>
+            <ac:spMk id="17" creationId="{B852A2E4-B857-4ECD-F99E-C81053476EF5}"/>
+          </ac:spMkLst>
+        </pc:spChg>
+        <pc:spChg chg="del mod">
+          <ac:chgData name="Henrique Cambraia" userId="1615583aa607cfb6" providerId="LiveId" clId="{76F43D00-1EDB-41F2-B935-87E7A99C1490}" dt="2022-08-03T23:33:13.637" v="36" actId="478"/>
+          <ac:spMkLst>
+            <pc:docMk/>
+            <pc:sldMk cId="3009845630" sldId="260"/>
+            <ac:spMk id="20" creationId="{200C0CDE-F38C-3A7A-CF3D-97809641C879}"/>
+          </ac:spMkLst>
+        </pc:spChg>
+        <pc:grpChg chg="del">
+          <ac:chgData name="Henrique Cambraia" userId="1615583aa607cfb6" providerId="LiveId" clId="{76F43D00-1EDB-41F2-B935-87E7A99C1490}" dt="2022-08-03T23:31:48.021" v="18" actId="478"/>
+          <ac:grpSpMkLst>
+            <pc:docMk/>
+            <pc:sldMk cId="3009845630" sldId="260"/>
+            <ac:grpSpMk id="26" creationId="{8FF5C318-CDB9-5DFE-30CD-C910B4CFE71A}"/>
+          </ac:grpSpMkLst>
+        </pc:grpChg>
+        <pc:grpChg chg="mod">
+          <ac:chgData name="Henrique Cambraia" userId="1615583aa607cfb6" providerId="LiveId" clId="{76F43D00-1EDB-41F2-B935-87E7A99C1490}" dt="2022-08-03T23:32:47.125" v="30" actId="1076"/>
+          <ac:grpSpMkLst>
+            <pc:docMk/>
+            <pc:sldMk cId="3009845630" sldId="260"/>
+            <ac:grpSpMk id="31" creationId="{9731C1E3-C638-3CFC-AFAA-2E906DA34C81}"/>
+          </ac:grpSpMkLst>
+        </pc:grpChg>
+        <pc:picChg chg="del">
+          <ac:chgData name="Henrique Cambraia" userId="1615583aa607cfb6" providerId="LiveId" clId="{76F43D00-1EDB-41F2-B935-87E7A99C1490}" dt="2022-08-03T23:31:48.021" v="18" actId="478"/>
+          <ac:picMkLst>
+            <pc:docMk/>
+            <pc:sldMk cId="3009845630" sldId="260"/>
+            <ac:picMk id="3" creationId="{A54EDF3D-2D17-FEC8-E9C8-3F1243EEA83E}"/>
+          </ac:picMkLst>
+        </pc:picChg>
+        <pc:picChg chg="add mod">
+          <ac:chgData name="Henrique Cambraia" userId="1615583aa607cfb6" providerId="LiveId" clId="{76F43D00-1EDB-41F2-B935-87E7A99C1490}" dt="2022-08-03T23:31:52.837" v="20" actId="1076"/>
+          <ac:picMkLst>
+            <pc:docMk/>
+            <pc:sldMk cId="3009845630" sldId="260"/>
+            <ac:picMk id="4" creationId="{628ABD37-FF91-C0AB-8829-F00B4696259D}"/>
+          </ac:picMkLst>
+        </pc:picChg>
+        <pc:picChg chg="add mod">
+          <ac:chgData name="Henrique Cambraia" userId="1615583aa607cfb6" providerId="LiveId" clId="{76F43D00-1EDB-41F2-B935-87E7A99C1490}" dt="2022-08-03T23:33:23.644" v="38" actId="1076"/>
+          <ac:picMkLst>
+            <pc:docMk/>
+            <pc:sldMk cId="3009845630" sldId="260"/>
+            <ac:picMk id="8" creationId="{625938D4-D181-A24F-E813-2C1C56E2CF46}"/>
+          </ac:picMkLst>
+        </pc:picChg>
+        <pc:picChg chg="del">
+          <ac:chgData name="Henrique Cambraia" userId="1615583aa607cfb6" providerId="LiveId" clId="{76F43D00-1EDB-41F2-B935-87E7A99C1490}" dt="2022-08-03T23:31:48.021" v="18" actId="478"/>
+          <ac:picMkLst>
+            <pc:docMk/>
+            <pc:sldMk cId="3009845630" sldId="260"/>
+            <ac:picMk id="19" creationId="{5ABB23BD-D746-7A22-9E58-FFA9FCC035EA}"/>
+          </ac:picMkLst>
+        </pc:picChg>
+        <pc:picChg chg="del">
+          <ac:chgData name="Henrique Cambraia" userId="1615583aa607cfb6" providerId="LiveId" clId="{76F43D00-1EDB-41F2-B935-87E7A99C1490}" dt="2022-08-03T23:31:48.021" v="18" actId="478"/>
+          <ac:picMkLst>
+            <pc:docMk/>
+            <pc:sldMk cId="3009845630" sldId="260"/>
+            <ac:picMk id="24" creationId="{9980DD59-5D39-4E0C-1EC2-3B28103B4DF0}"/>
+          </ac:picMkLst>
+        </pc:picChg>
+        <pc:picChg chg="del">
+          <ac:chgData name="Henrique Cambraia" userId="1615583aa607cfb6" providerId="LiveId" clId="{76F43D00-1EDB-41F2-B935-87E7A99C1490}" dt="2022-08-03T23:31:48.021" v="18" actId="478"/>
+          <ac:picMkLst>
+            <pc:docMk/>
+            <pc:sldMk cId="3009845630" sldId="260"/>
+            <ac:picMk id="37" creationId="{6094182B-C294-C364-C530-A80A3829746D}"/>
+          </ac:picMkLst>
+        </pc:picChg>
+      </pc:sldChg>
+    </pc:docChg>
+  </pc:docChgLst>
 </pc:chgInfo>
 </file>
 
@@ -590,7 +990,7 @@
           <a:p>
             <a:fld id="{3514D64C-613B-4060-BBEA-72548A308419}" type="datetimeFigureOut">
               <a:rPr lang="pt-BR" smtClean="0"/>
-              <a:t>02/08/2022</a:t>
+              <a:t>03/08/2022</a:t>
             </a:fld>
             <a:endParaRPr lang="pt-BR"/>
           </a:p>
@@ -788,7 +1188,7 @@
           <a:p>
             <a:fld id="{3514D64C-613B-4060-BBEA-72548A308419}" type="datetimeFigureOut">
               <a:rPr lang="pt-BR" smtClean="0"/>
-              <a:t>02/08/2022</a:t>
+              <a:t>03/08/2022</a:t>
             </a:fld>
             <a:endParaRPr lang="pt-BR"/>
           </a:p>
@@ -996,7 +1396,7 @@
           <a:p>
             <a:fld id="{3514D64C-613B-4060-BBEA-72548A308419}" type="datetimeFigureOut">
               <a:rPr lang="pt-BR" smtClean="0"/>
-              <a:t>02/08/2022</a:t>
+              <a:t>03/08/2022</a:t>
             </a:fld>
             <a:endParaRPr lang="pt-BR"/>
           </a:p>
@@ -1194,7 +1594,7 @@
           <a:p>
             <a:fld id="{3514D64C-613B-4060-BBEA-72548A308419}" type="datetimeFigureOut">
               <a:rPr lang="pt-BR" smtClean="0"/>
-              <a:t>02/08/2022</a:t>
+              <a:t>03/08/2022</a:t>
             </a:fld>
             <a:endParaRPr lang="pt-BR"/>
           </a:p>
@@ -1469,7 +1869,7 @@
           <a:p>
             <a:fld id="{3514D64C-613B-4060-BBEA-72548A308419}" type="datetimeFigureOut">
               <a:rPr lang="pt-BR" smtClean="0"/>
-              <a:t>02/08/2022</a:t>
+              <a:t>03/08/2022</a:t>
             </a:fld>
             <a:endParaRPr lang="pt-BR"/>
           </a:p>
@@ -1734,7 +2134,7 @@
           <a:p>
             <a:fld id="{3514D64C-613B-4060-BBEA-72548A308419}" type="datetimeFigureOut">
               <a:rPr lang="pt-BR" smtClean="0"/>
-              <a:t>02/08/2022</a:t>
+              <a:t>03/08/2022</a:t>
             </a:fld>
             <a:endParaRPr lang="pt-BR"/>
           </a:p>
@@ -2146,7 +2546,7 @@
           <a:p>
             <a:fld id="{3514D64C-613B-4060-BBEA-72548A308419}" type="datetimeFigureOut">
               <a:rPr lang="pt-BR" smtClean="0"/>
-              <a:t>02/08/2022</a:t>
+              <a:t>03/08/2022</a:t>
             </a:fld>
             <a:endParaRPr lang="pt-BR"/>
           </a:p>
@@ -2287,7 +2687,7 @@
           <a:p>
             <a:fld id="{3514D64C-613B-4060-BBEA-72548A308419}" type="datetimeFigureOut">
               <a:rPr lang="pt-BR" smtClean="0"/>
-              <a:t>02/08/2022</a:t>
+              <a:t>03/08/2022</a:t>
             </a:fld>
             <a:endParaRPr lang="pt-BR"/>
           </a:p>
@@ -2400,7 +2800,7 @@
           <a:p>
             <a:fld id="{3514D64C-613B-4060-BBEA-72548A308419}" type="datetimeFigureOut">
               <a:rPr lang="pt-BR" smtClean="0"/>
-              <a:t>02/08/2022</a:t>
+              <a:t>03/08/2022</a:t>
             </a:fld>
             <a:endParaRPr lang="pt-BR"/>
           </a:p>
@@ -2711,7 +3111,7 @@
           <a:p>
             <a:fld id="{3514D64C-613B-4060-BBEA-72548A308419}" type="datetimeFigureOut">
               <a:rPr lang="pt-BR" smtClean="0"/>
-              <a:t>02/08/2022</a:t>
+              <a:t>03/08/2022</a:t>
             </a:fld>
             <a:endParaRPr lang="pt-BR"/>
           </a:p>
@@ -2999,7 +3399,7 @@
           <a:p>
             <a:fld id="{3514D64C-613B-4060-BBEA-72548A308419}" type="datetimeFigureOut">
               <a:rPr lang="pt-BR" smtClean="0"/>
-              <a:t>02/08/2022</a:t>
+              <a:t>03/08/2022</a:t>
             </a:fld>
             <a:endParaRPr lang="pt-BR"/>
           </a:p>
@@ -3240,7 +3640,7 @@
           <a:p>
             <a:fld id="{3514D64C-613B-4060-BBEA-72548A308419}" type="datetimeFigureOut">
               <a:rPr lang="pt-BR" smtClean="0"/>
-              <a:t>02/08/2022</a:t>
+              <a:t>03/08/2022</a:t>
             </a:fld>
             <a:endParaRPr lang="pt-BR"/>
           </a:p>
@@ -4076,10 +4476,10 @@
       </p:sp>
       <p:sp>
         <p:nvSpPr>
-          <p:cNvPr id="7" name="Retângulo 6">
-            <a:extLst>
-              <a:ext uri="{FF2B5EF4-FFF2-40B4-BE49-F238E27FC236}">
-                <a16:creationId xmlns:a16="http://schemas.microsoft.com/office/drawing/2014/main" id="{B95AFAFF-702C-65A8-8236-263B52FB0E06}"/>
+          <p:cNvPr id="13" name="Retângulo 12">
+            <a:extLst>
+              <a:ext uri="{FF2B5EF4-FFF2-40B4-BE49-F238E27FC236}">
+                <a16:creationId xmlns:a16="http://schemas.microsoft.com/office/drawing/2014/main" id="{7CE4DFB2-9AB4-012B-7B38-FB56A5D82A9C}"/>
               </a:ext>
             </a:extLst>
           </p:cNvPr>
@@ -4088,8 +4488,8 @@
         </p:nvSpPr>
         <p:spPr>
           <a:xfrm>
-            <a:off x="0" y="0"/>
-            <a:ext cx="12192000" cy="735106"/>
+            <a:off x="4303059" y="707060"/>
+            <a:ext cx="4208930" cy="3151577"/>
           </a:xfrm>
           <a:prstGeom prst="rect">
             <a:avLst/>
@@ -4117,16 +4517,46 @@
           <a:lstStyle/>
           <a:p>
             <a:pPr algn="ctr"/>
-            <a:endParaRPr lang="pt-BR"/>
-          </a:p>
-        </p:txBody>
-      </p:sp>
-      <p:sp>
-        <p:nvSpPr>
-          <p:cNvPr id="9" name="Retângulo 8">
-            <a:extLst>
-              <a:ext uri="{FF2B5EF4-FFF2-40B4-BE49-F238E27FC236}">
-                <a16:creationId xmlns:a16="http://schemas.microsoft.com/office/drawing/2014/main" id="{9BCD9B27-E647-F593-EB4D-E74C2BAC908A}"/>
+            <a:endParaRPr lang="pt-BR" dirty="0"/>
+          </a:p>
+        </p:txBody>
+      </p:sp>
+      <p:pic>
+        <p:nvPicPr>
+          <p:cNvPr id="8" name="Imagem 7">
+            <a:extLst>
+              <a:ext uri="{FF2B5EF4-FFF2-40B4-BE49-F238E27FC236}">
+                <a16:creationId xmlns:a16="http://schemas.microsoft.com/office/drawing/2014/main" id="{2F3E67DB-6671-B94B-BF43-2C18B188E2D3}"/>
+              </a:ext>
+            </a:extLst>
+          </p:cNvPr>
+          <p:cNvPicPr>
+            <a:picLocks noChangeAspect="1"/>
+          </p:cNvPicPr>
+          <p:nvPr/>
+        </p:nvPicPr>
+        <p:blipFill>
+          <a:blip r:embed="rId2"/>
+          <a:stretch>
+            <a:fillRect/>
+          </a:stretch>
+        </p:blipFill>
+        <p:spPr>
+          <a:xfrm>
+            <a:off x="0" y="-26894"/>
+            <a:ext cx="12192000" cy="545911"/>
+          </a:xfrm>
+          <a:prstGeom prst="rect">
+            <a:avLst/>
+          </a:prstGeom>
+        </p:spPr>
+      </p:pic>
+      <p:sp>
+        <p:nvSpPr>
+          <p:cNvPr id="27" name="Retângulo 26">
+            <a:extLst>
+              <a:ext uri="{FF2B5EF4-FFF2-40B4-BE49-F238E27FC236}">
+                <a16:creationId xmlns:a16="http://schemas.microsoft.com/office/drawing/2014/main" id="{AA2E6CC0-9BE9-BC7A-707F-9FDD6ADE188B}"/>
               </a:ext>
             </a:extLst>
           </p:cNvPr>
@@ -4135,8 +4565,8 @@
         </p:nvSpPr>
         <p:spPr>
           <a:xfrm>
-            <a:off x="283028" y="950686"/>
-            <a:ext cx="2445658" cy="3011714"/>
+            <a:off x="4303059" y="4046680"/>
+            <a:ext cx="4208930" cy="2251292"/>
           </a:xfrm>
           <a:prstGeom prst="rect">
             <a:avLst/>
@@ -4164,16 +4594,16 @@
           <a:lstStyle/>
           <a:p>
             <a:pPr algn="ctr"/>
-            <a:endParaRPr lang="pt-BR"/>
-          </a:p>
-        </p:txBody>
-      </p:sp>
-      <p:sp>
-        <p:nvSpPr>
-          <p:cNvPr id="10" name="Retângulo 9">
-            <a:extLst>
-              <a:ext uri="{FF2B5EF4-FFF2-40B4-BE49-F238E27FC236}">
-                <a16:creationId xmlns:a16="http://schemas.microsoft.com/office/drawing/2014/main" id="{9E49CC9D-5B39-E0C8-650C-8E1D7F17833C}"/>
+            <a:endParaRPr lang="pt-BR" dirty="0"/>
+          </a:p>
+        </p:txBody>
+      </p:sp>
+      <p:sp>
+        <p:nvSpPr>
+          <p:cNvPr id="28" name="Retângulo 27">
+            <a:extLst>
+              <a:ext uri="{FF2B5EF4-FFF2-40B4-BE49-F238E27FC236}">
+                <a16:creationId xmlns:a16="http://schemas.microsoft.com/office/drawing/2014/main" id="{4DA13376-9E47-D239-0820-0D0F39448339}"/>
               </a:ext>
             </a:extLst>
           </p:cNvPr>
@@ -4182,8 +4612,8 @@
         </p:nvSpPr>
         <p:spPr>
           <a:xfrm>
-            <a:off x="283028" y="4177980"/>
-            <a:ext cx="2445658" cy="2237334"/>
+            <a:off x="9007661" y="707061"/>
+            <a:ext cx="2901310" cy="4994491"/>
           </a:xfrm>
           <a:prstGeom prst="rect">
             <a:avLst/>
@@ -4211,16 +4641,16 @@
           <a:lstStyle/>
           <a:p>
             <a:pPr algn="ctr"/>
-            <a:endParaRPr lang="pt-BR"/>
-          </a:p>
-        </p:txBody>
-      </p:sp>
-      <p:sp>
-        <p:nvSpPr>
-          <p:cNvPr id="11" name="Retângulo 10">
-            <a:extLst>
-              <a:ext uri="{FF2B5EF4-FFF2-40B4-BE49-F238E27FC236}">
-                <a16:creationId xmlns:a16="http://schemas.microsoft.com/office/drawing/2014/main" id="{14036E0E-F847-D122-6FB4-C202F9EA8C73}"/>
+            <a:endParaRPr lang="pt-BR" dirty="0"/>
+          </a:p>
+        </p:txBody>
+      </p:sp>
+      <p:sp>
+        <p:nvSpPr>
+          <p:cNvPr id="29" name="Retângulo 28">
+            <a:extLst>
+              <a:ext uri="{FF2B5EF4-FFF2-40B4-BE49-F238E27FC236}">
+                <a16:creationId xmlns:a16="http://schemas.microsoft.com/office/drawing/2014/main" id="{51E92512-D413-2966-698A-74373C22CE6B}"/>
               </a:ext>
             </a:extLst>
           </p:cNvPr>
@@ -4229,8 +4659,8 @@
         </p:nvSpPr>
         <p:spPr>
           <a:xfrm>
-            <a:off x="2924628" y="950686"/>
-            <a:ext cx="8984343" cy="1052285"/>
+            <a:off x="151866" y="707060"/>
+            <a:ext cx="2901310" cy="4994491"/>
           </a:xfrm>
           <a:prstGeom prst="rect">
             <a:avLst/>
@@ -4258,16 +4688,16 @@
           <a:lstStyle/>
           <a:p>
             <a:pPr algn="ctr"/>
-            <a:endParaRPr lang="pt-BR"/>
-          </a:p>
-        </p:txBody>
-      </p:sp>
-      <p:sp>
-        <p:nvSpPr>
-          <p:cNvPr id="13" name="Retângulo 12">
-            <a:extLst>
-              <a:ext uri="{FF2B5EF4-FFF2-40B4-BE49-F238E27FC236}">
-                <a16:creationId xmlns:a16="http://schemas.microsoft.com/office/drawing/2014/main" id="{7CE4DFB2-9AB4-012B-7B38-FB56A5D82A9C}"/>
+            <a:endParaRPr lang="pt-BR" dirty="0"/>
+          </a:p>
+        </p:txBody>
+      </p:sp>
+      <p:sp>
+        <p:nvSpPr>
+          <p:cNvPr id="38" name="Retângulo 37">
+            <a:extLst>
+              <a:ext uri="{FF2B5EF4-FFF2-40B4-BE49-F238E27FC236}">
+                <a16:creationId xmlns:a16="http://schemas.microsoft.com/office/drawing/2014/main" id="{5BC0E9D3-830F-E0B9-152A-3A52B2873BD3}"/>
               </a:ext>
             </a:extLst>
           </p:cNvPr>
@@ -4276,8 +4706,8 @@
         </p:nvSpPr>
         <p:spPr>
           <a:xfrm>
-            <a:off x="2924628" y="2218551"/>
-            <a:ext cx="8984343" cy="4196763"/>
+            <a:off x="322731" y="1087391"/>
+            <a:ext cx="2420470" cy="519954"/>
           </a:xfrm>
           <a:prstGeom prst="rect">
             <a:avLst/>
@@ -4305,16 +4735,16 @@
           <a:lstStyle/>
           <a:p>
             <a:pPr algn="ctr"/>
-            <a:endParaRPr lang="pt-BR" dirty="0"/>
-          </a:p>
-        </p:txBody>
-      </p:sp>
-      <p:sp>
-        <p:nvSpPr>
-          <p:cNvPr id="17" name="Retângulo 16">
-            <a:extLst>
-              <a:ext uri="{FF2B5EF4-FFF2-40B4-BE49-F238E27FC236}">
-                <a16:creationId xmlns:a16="http://schemas.microsoft.com/office/drawing/2014/main" id="{B852A2E4-B857-4ECD-F99E-C81053476EF5}"/>
+            <a:endParaRPr lang="pt-BR"/>
+          </a:p>
+        </p:txBody>
+      </p:sp>
+      <p:sp>
+        <p:nvSpPr>
+          <p:cNvPr id="42" name="Retângulo 41">
+            <a:extLst>
+              <a:ext uri="{FF2B5EF4-FFF2-40B4-BE49-F238E27FC236}">
+                <a16:creationId xmlns:a16="http://schemas.microsoft.com/office/drawing/2014/main" id="{031617E3-8E05-59E9-2753-6163C129D69D}"/>
               </a:ext>
             </a:extLst>
           </p:cNvPr>
@@ -4323,8 +4753,8 @@
         </p:nvSpPr>
         <p:spPr>
           <a:xfrm>
-            <a:off x="1001487" y="108858"/>
-            <a:ext cx="3976913" cy="519954"/>
+            <a:off x="306851" y="2344664"/>
+            <a:ext cx="2420470" cy="828790"/>
           </a:xfrm>
           <a:prstGeom prst="rect">
             <a:avLst/>
@@ -4358,10 +4788,10 @@
       </p:sp>
       <p:pic>
         <p:nvPicPr>
-          <p:cNvPr id="19" name="Gráfico 18" descr="Renovação (Casa com faíscas) com preenchimento sólido">
-            <a:extLst>
-              <a:ext uri="{FF2B5EF4-FFF2-40B4-BE49-F238E27FC236}">
-                <a16:creationId xmlns:a16="http://schemas.microsoft.com/office/drawing/2014/main" id="{5ABB23BD-D746-7A22-9E58-FFA9FCC035EA}"/>
+          <p:cNvPr id="16" name="Imagem 15">
+            <a:extLst>
+              <a:ext uri="{FF2B5EF4-FFF2-40B4-BE49-F238E27FC236}">
+                <a16:creationId xmlns:a16="http://schemas.microsoft.com/office/drawing/2014/main" id="{93174367-AFF2-19B5-CD93-0171FCBF931A}"/>
               </a:ext>
             </a:extLst>
           </p:cNvPr>
@@ -4371,24 +4801,15 @@
           <p:nvPr/>
         </p:nvPicPr>
         <p:blipFill>
-          <a:blip r:embed="rId2">
-            <a:extLst>
-              <a:ext uri="{28A0092B-C50C-407E-A947-70E740481C1C}">
-                <a14:useLocalDpi xmlns:a14="http://schemas.microsoft.com/office/drawing/2010/main" val="0"/>
-              </a:ext>
-              <a:ext uri="{96DAC541-7B7A-43D3-8B79-37D633B846F1}">
-                <asvg:svgBlip xmlns:asvg="http://schemas.microsoft.com/office/drawing/2016/SVG/main" r:embed="rId3"/>
-              </a:ext>
-            </a:extLst>
-          </a:blip>
+          <a:blip r:embed="rId3"/>
           <a:stretch>
             <a:fillRect/>
           </a:stretch>
         </p:blipFill>
         <p:spPr>
           <a:xfrm>
-            <a:off x="6884789" y="135842"/>
-            <a:ext cx="428172" cy="428172"/>
+            <a:off x="1124693" y="1795388"/>
+            <a:ext cx="990738" cy="304843"/>
           </a:xfrm>
           <a:prstGeom prst="rect">
             <a:avLst/>
@@ -4397,10 +4818,10 @@
       </p:pic>
       <p:pic>
         <p:nvPicPr>
-          <p:cNvPr id="24" name="Gráfico 23" descr="Lupa estrutura de tópicos">
-            <a:extLst>
-              <a:ext uri="{FF2B5EF4-FFF2-40B4-BE49-F238E27FC236}">
-                <a16:creationId xmlns:a16="http://schemas.microsoft.com/office/drawing/2014/main" id="{9980DD59-5D39-4E0C-1EC2-3B28103B4DF0}"/>
+          <p:cNvPr id="20" name="Imagem 19">
+            <a:extLst>
+              <a:ext uri="{FF2B5EF4-FFF2-40B4-BE49-F238E27FC236}">
+                <a16:creationId xmlns:a16="http://schemas.microsoft.com/office/drawing/2014/main" id="{9E44B425-AADA-0ADE-4CBD-AFDF0817A707}"/>
               </a:ext>
             </a:extLst>
           </p:cNvPr>
@@ -4410,30 +4831,657 @@
           <p:nvPr/>
         </p:nvPicPr>
         <p:blipFill>
-          <a:blip r:embed="rId4">
-            <a:extLst>
-              <a:ext uri="{28A0092B-C50C-407E-A947-70E740481C1C}">
-                <a14:useLocalDpi xmlns:a14="http://schemas.microsoft.com/office/drawing/2010/main" val="0"/>
-              </a:ext>
-              <a:ext uri="{96DAC541-7B7A-43D3-8B79-37D633B846F1}">
-                <asvg:svgBlip xmlns:asvg="http://schemas.microsoft.com/office/drawing/2016/SVG/main" r:embed="rId5"/>
-              </a:ext>
-            </a:extLst>
-          </a:blip>
+          <a:blip r:embed="rId4"/>
           <a:stretch>
             <a:fillRect/>
           </a:stretch>
         </p:blipFill>
         <p:spPr>
           <a:xfrm>
-            <a:off x="1081316" y="257417"/>
-            <a:ext cx="283028" cy="283028"/>
+            <a:off x="1146760" y="3361497"/>
+            <a:ext cx="1105054" cy="828791"/>
           </a:xfrm>
           <a:prstGeom prst="rect">
             <a:avLst/>
           </a:prstGeom>
         </p:spPr>
       </p:pic>
+      <p:pic>
+        <p:nvPicPr>
+          <p:cNvPr id="22" name="Imagem 21">
+            <a:extLst>
+              <a:ext uri="{FF2B5EF4-FFF2-40B4-BE49-F238E27FC236}">
+                <a16:creationId xmlns:a16="http://schemas.microsoft.com/office/drawing/2014/main" id="{3663F33D-3BF8-53F5-DDC4-1B5C4AD36887}"/>
+              </a:ext>
+            </a:extLst>
+          </p:cNvPr>
+          <p:cNvPicPr>
+            <a:picLocks noChangeAspect="1"/>
+          </p:cNvPicPr>
+          <p:nvPr/>
+        </p:nvPicPr>
+        <p:blipFill>
+          <a:blip r:embed="rId5"/>
+          <a:stretch>
+            <a:fillRect/>
+          </a:stretch>
+        </p:blipFill>
+        <p:spPr>
+          <a:xfrm>
+            <a:off x="5364391" y="2868657"/>
+            <a:ext cx="2086266" cy="790685"/>
+          </a:xfrm>
+          <a:prstGeom prst="rect">
+            <a:avLst/>
+          </a:prstGeom>
+        </p:spPr>
+      </p:pic>
+      <p:pic>
+        <p:nvPicPr>
+          <p:cNvPr id="25" name="Imagem 24">
+            <a:extLst>
+              <a:ext uri="{FF2B5EF4-FFF2-40B4-BE49-F238E27FC236}">
+                <a16:creationId xmlns:a16="http://schemas.microsoft.com/office/drawing/2014/main" id="{DC9E7ADB-7AF1-C728-677A-5728A8433956}"/>
+              </a:ext>
+            </a:extLst>
+          </p:cNvPr>
+          <p:cNvPicPr>
+            <a:picLocks noChangeAspect="1"/>
+          </p:cNvPicPr>
+          <p:nvPr/>
+        </p:nvPicPr>
+        <p:blipFill>
+          <a:blip r:embed="rId6"/>
+          <a:stretch>
+            <a:fillRect/>
+          </a:stretch>
+        </p:blipFill>
+        <p:spPr>
+          <a:xfrm>
+            <a:off x="5226424" y="860195"/>
+            <a:ext cx="2115670" cy="2044934"/>
+          </a:xfrm>
+          <a:prstGeom prst="rect">
+            <a:avLst/>
+          </a:prstGeom>
+        </p:spPr>
+      </p:pic>
+      <p:sp>
+        <p:nvSpPr>
+          <p:cNvPr id="45" name="Retângulo 44">
+            <a:extLst>
+              <a:ext uri="{FF2B5EF4-FFF2-40B4-BE49-F238E27FC236}">
+                <a16:creationId xmlns:a16="http://schemas.microsoft.com/office/drawing/2014/main" id="{DBC505A3-4B03-169C-289D-D31285CD337A}"/>
+              </a:ext>
+            </a:extLst>
+          </p:cNvPr>
+          <p:cNvSpPr/>
+          <p:nvPr/>
+        </p:nvSpPr>
+        <p:spPr>
+          <a:xfrm>
+            <a:off x="4303059" y="3910403"/>
+            <a:ext cx="4208930" cy="2947597"/>
+          </a:xfrm>
+          <a:prstGeom prst="rect">
+            <a:avLst/>
+          </a:prstGeom>
+          <a:solidFill>
+            <a:schemeClr val="bg1"/>
+          </a:solidFill>
+        </p:spPr>
+        <p:style>
+          <a:lnRef idx="1">
+            <a:schemeClr val="accent3"/>
+          </a:lnRef>
+          <a:fillRef idx="2">
+            <a:schemeClr val="accent3"/>
+          </a:fillRef>
+          <a:effectRef idx="1">
+            <a:schemeClr val="accent3"/>
+          </a:effectRef>
+          <a:fontRef idx="minor">
+            <a:schemeClr val="dk1"/>
+          </a:fontRef>
+        </p:style>
+        <p:txBody>
+          <a:bodyPr rtlCol="0" anchor="ctr"/>
+          <a:lstStyle/>
+          <a:p>
+            <a:pPr algn="ctr"/>
+            <a:endParaRPr lang="pt-BR" dirty="0"/>
+          </a:p>
+        </p:txBody>
+      </p:sp>
+      <p:pic>
+        <p:nvPicPr>
+          <p:cNvPr id="46" name="Imagem 45">
+            <a:extLst>
+              <a:ext uri="{FF2B5EF4-FFF2-40B4-BE49-F238E27FC236}">
+                <a16:creationId xmlns:a16="http://schemas.microsoft.com/office/drawing/2014/main" id="{7387A20E-AA8D-DAD8-75F8-4FAFA1922042}"/>
+              </a:ext>
+            </a:extLst>
+          </p:cNvPr>
+          <p:cNvPicPr>
+            <a:picLocks noChangeAspect="1"/>
+          </p:cNvPicPr>
+          <p:nvPr/>
+        </p:nvPicPr>
+        <p:blipFill>
+          <a:blip r:embed="rId5"/>
+          <a:stretch>
+            <a:fillRect/>
+          </a:stretch>
+        </p:blipFill>
+        <p:spPr>
+          <a:xfrm>
+            <a:off x="5364391" y="5977871"/>
+            <a:ext cx="2086266" cy="790685"/>
+          </a:xfrm>
+          <a:prstGeom prst="rect">
+            <a:avLst/>
+          </a:prstGeom>
+        </p:spPr>
+      </p:pic>
+      <p:pic>
+        <p:nvPicPr>
+          <p:cNvPr id="47" name="Imagem 46">
+            <a:extLst>
+              <a:ext uri="{FF2B5EF4-FFF2-40B4-BE49-F238E27FC236}">
+                <a16:creationId xmlns:a16="http://schemas.microsoft.com/office/drawing/2014/main" id="{B4831BFA-AEBE-4AEA-9C2A-E585D160E49B}"/>
+              </a:ext>
+            </a:extLst>
+          </p:cNvPr>
+          <p:cNvPicPr>
+            <a:picLocks noChangeAspect="1"/>
+          </p:cNvPicPr>
+          <p:nvPr/>
+        </p:nvPicPr>
+        <p:blipFill>
+          <a:blip r:embed="rId6"/>
+          <a:stretch>
+            <a:fillRect/>
+          </a:stretch>
+        </p:blipFill>
+        <p:spPr>
+          <a:xfrm>
+            <a:off x="5226424" y="3996303"/>
+            <a:ext cx="2115670" cy="2044934"/>
+          </a:xfrm>
+          <a:prstGeom prst="rect">
+            <a:avLst/>
+          </a:prstGeom>
+        </p:spPr>
+      </p:pic>
+      <p:sp>
+        <p:nvSpPr>
+          <p:cNvPr id="49" name="CaixaDeTexto 48">
+            <a:extLst>
+              <a:ext uri="{FF2B5EF4-FFF2-40B4-BE49-F238E27FC236}">
+                <a16:creationId xmlns:a16="http://schemas.microsoft.com/office/drawing/2014/main" id="{4F78B913-53C6-AC06-A8AF-57AFCCAAB0C0}"/>
+              </a:ext>
+            </a:extLst>
+          </p:cNvPr>
+          <p:cNvSpPr txBox="1"/>
+          <p:nvPr/>
+        </p:nvSpPr>
+        <p:spPr>
+          <a:xfrm>
+            <a:off x="9007661" y="1052905"/>
+            <a:ext cx="2901310" cy="2308324"/>
+          </a:xfrm>
+          <a:prstGeom prst="rect">
+            <a:avLst/>
+          </a:prstGeom>
+          <a:noFill/>
+        </p:spPr>
+        <p:txBody>
+          <a:bodyPr wrap="square">
+            <a:spAutoFit/>
+          </a:bodyPr>
+          <a:lstStyle/>
+          <a:p>
+            <a:pPr algn="ctr"/>
+            <a:r>
+              <a:rPr lang="pt-BR" b="1" i="0" dirty="0">
+                <a:solidFill>
+                  <a:srgbClr val="000000"/>
+                </a:solidFill>
+                <a:effectLst/>
+                <a:latin typeface="Montserrat" panose="00000500000000000000" pitchFamily="2" charset="0"/>
+              </a:rPr>
+              <a:t>Em Alta</a:t>
+            </a:r>
+          </a:p>
+          <a:p>
+            <a:pPr algn="l">
+              <a:buFont typeface="Arial" panose="020B0604020202020204" pitchFamily="34" charset="0"/>
+              <a:buChar char="•"/>
+            </a:pPr>
+            <a:r>
+              <a:rPr lang="pt-BR" b="0" i="0" u="none" strike="noStrike" dirty="0">
+                <a:solidFill>
+                  <a:srgbClr val="000000"/>
+                </a:solidFill>
+                <a:effectLst/>
+                <a:latin typeface="Montserrat" panose="00000500000000000000" pitchFamily="2" charset="0"/>
+                <a:hlinkClick r:id="rId7"/>
+              </a:rPr>
+              <a:t>Arábica</a:t>
+            </a:r>
+            <a:endParaRPr lang="pt-BR" b="0" i="0" dirty="0">
+              <a:solidFill>
+                <a:srgbClr val="000000"/>
+              </a:solidFill>
+              <a:effectLst/>
+              <a:latin typeface="Montserrat" panose="00000500000000000000" pitchFamily="2" charset="0"/>
+            </a:endParaRPr>
+          </a:p>
+          <a:p>
+            <a:pPr algn="l">
+              <a:buFont typeface="Arial" panose="020B0604020202020204" pitchFamily="34" charset="0"/>
+              <a:buChar char="•"/>
+            </a:pPr>
+            <a:r>
+              <a:rPr lang="pt-BR" b="0" i="0" u="none" strike="noStrike" dirty="0" err="1">
+                <a:solidFill>
+                  <a:srgbClr val="000000"/>
+                </a:solidFill>
+                <a:effectLst/>
+                <a:latin typeface="Montserrat" panose="00000500000000000000" pitchFamily="2" charset="0"/>
+                <a:hlinkClick r:id="rId8"/>
+              </a:rPr>
+              <a:t>Conilon</a:t>
+            </a:r>
+            <a:endParaRPr lang="pt-BR" b="0" i="0" dirty="0">
+              <a:solidFill>
+                <a:srgbClr val="000000"/>
+              </a:solidFill>
+              <a:effectLst/>
+              <a:latin typeface="Montserrat" panose="00000500000000000000" pitchFamily="2" charset="0"/>
+            </a:endParaRPr>
+          </a:p>
+          <a:p>
+            <a:pPr algn="l">
+              <a:buFont typeface="Arial" panose="020B0604020202020204" pitchFamily="34" charset="0"/>
+              <a:buChar char="•"/>
+            </a:pPr>
+            <a:r>
+              <a:rPr lang="pt-BR" b="0" i="0" u="none" strike="noStrike" dirty="0">
+                <a:solidFill>
+                  <a:srgbClr val="000000"/>
+                </a:solidFill>
+                <a:effectLst/>
+                <a:latin typeface="Montserrat" panose="00000500000000000000" pitchFamily="2" charset="0"/>
+                <a:hlinkClick r:id="rId9"/>
+              </a:rPr>
+              <a:t>Bebida Dura (Cotação)</a:t>
+            </a:r>
+            <a:endParaRPr lang="pt-BR" b="0" i="0" dirty="0">
+              <a:solidFill>
+                <a:srgbClr val="000000"/>
+              </a:solidFill>
+              <a:effectLst/>
+              <a:latin typeface="Montserrat" panose="00000500000000000000" pitchFamily="2" charset="0"/>
+            </a:endParaRPr>
+          </a:p>
+          <a:p>
+            <a:pPr algn="l">
+              <a:buFont typeface="Arial" panose="020B0604020202020204" pitchFamily="34" charset="0"/>
+              <a:buChar char="•"/>
+            </a:pPr>
+            <a:r>
+              <a:rPr lang="pt-BR" b="0" i="0" u="none" strike="noStrike" dirty="0">
+                <a:solidFill>
+                  <a:srgbClr val="000000"/>
+                </a:solidFill>
+                <a:effectLst/>
+                <a:latin typeface="Montserrat" panose="00000500000000000000" pitchFamily="2" charset="0"/>
+                <a:hlinkClick r:id="rId10"/>
+              </a:rPr>
+              <a:t>Bebida Mole e Dura</a:t>
+            </a:r>
+            <a:endParaRPr lang="pt-BR" b="0" i="0" dirty="0">
+              <a:solidFill>
+                <a:srgbClr val="000000"/>
+              </a:solidFill>
+              <a:effectLst/>
+              <a:latin typeface="Montserrat" panose="00000500000000000000" pitchFamily="2" charset="0"/>
+            </a:endParaRPr>
+          </a:p>
+          <a:p>
+            <a:pPr algn="ctr"/>
+            <a:r>
+              <a:rPr lang="pt-BR" b="1" i="0" dirty="0">
+                <a:solidFill>
+                  <a:srgbClr val="000000"/>
+                </a:solidFill>
+                <a:effectLst/>
+                <a:latin typeface="Montserrat" panose="00000500000000000000" pitchFamily="2" charset="0"/>
+              </a:rPr>
+              <a:t>Link Uteis</a:t>
+            </a:r>
+          </a:p>
+          <a:p>
+            <a:pPr algn="l">
+              <a:buFont typeface="Arial" panose="020B0604020202020204" pitchFamily="34" charset="0"/>
+              <a:buChar char="•"/>
+            </a:pPr>
+            <a:r>
+              <a:rPr lang="pt-BR" b="0" i="0" u="none" strike="noStrike" dirty="0">
+                <a:solidFill>
+                  <a:srgbClr val="000000"/>
+                </a:solidFill>
+                <a:effectLst/>
+                <a:latin typeface="Montserrat" panose="00000500000000000000" pitchFamily="2" charset="0"/>
+                <a:hlinkClick r:id="rId11"/>
+              </a:rPr>
+              <a:t>HUB do Café</a:t>
+            </a:r>
+            <a:endParaRPr lang="pt-BR" b="0" i="0" dirty="0">
+              <a:solidFill>
+                <a:srgbClr val="000000"/>
+              </a:solidFill>
+              <a:effectLst/>
+              <a:latin typeface="Montserrat" panose="00000500000000000000" pitchFamily="2" charset="0"/>
+            </a:endParaRPr>
+          </a:p>
+          <a:p>
+            <a:pPr algn="l">
+              <a:buFont typeface="Arial" panose="020B0604020202020204" pitchFamily="34" charset="0"/>
+              <a:buChar char="•"/>
+            </a:pPr>
+            <a:r>
+              <a:rPr lang="pt-BR" b="0" i="0" u="none" strike="noStrike" dirty="0">
+                <a:solidFill>
+                  <a:srgbClr val="000000"/>
+                </a:solidFill>
+                <a:effectLst/>
+                <a:latin typeface="Montserrat" panose="00000500000000000000" pitchFamily="2" charset="0"/>
+                <a:hlinkClick r:id="rId12"/>
+              </a:rPr>
+              <a:t>Safras de Café</a:t>
+            </a:r>
+            <a:endParaRPr lang="pt-BR" b="0" i="0" dirty="0">
+              <a:solidFill>
+                <a:srgbClr val="000000"/>
+              </a:solidFill>
+              <a:effectLst/>
+              <a:latin typeface="Montserrat" panose="00000500000000000000" pitchFamily="2" charset="0"/>
+            </a:endParaRPr>
+          </a:p>
+        </p:txBody>
+      </p:sp>
+    </p:spTree>
+    <p:extLst>
+      <p:ext uri="{BB962C8B-B14F-4D97-AF65-F5344CB8AC3E}">
+        <p14:creationId xmlns:p14="http://schemas.microsoft.com/office/powerpoint/2010/main" val="2686754018"/>
+      </p:ext>
+    </p:extLst>
+  </p:cSld>
+  <p:clrMapOvr>
+    <a:masterClrMapping/>
+  </p:clrMapOvr>
+</p:sld>
+</file>
+
+<file path=ppt/slides/slide3.xml><?xml version="1.0" encoding="utf-8"?>
+<p:sld xmlns:a="http://schemas.openxmlformats.org/drawingml/2006/main" xmlns:r="http://schemas.openxmlformats.org/officeDocument/2006/relationships" xmlns:p="http://schemas.openxmlformats.org/presentationml/2006/main">
+  <p:cSld>
+    <p:spTree>
+      <p:nvGrpSpPr>
+        <p:cNvPr id="1" name=""/>
+        <p:cNvGrpSpPr/>
+        <p:nvPr/>
+      </p:nvGrpSpPr>
+      <p:grpSpPr>
+        <a:xfrm>
+          <a:off x="0" y="0"/>
+          <a:ext cx="0" cy="0"/>
+          <a:chOff x="0" y="0"/>
+          <a:chExt cx="0" cy="0"/>
+        </a:xfrm>
+      </p:grpSpPr>
+      <p:sp>
+        <p:nvSpPr>
+          <p:cNvPr id="6" name="Retângulo 5">
+            <a:extLst>
+              <a:ext uri="{FF2B5EF4-FFF2-40B4-BE49-F238E27FC236}">
+                <a16:creationId xmlns:a16="http://schemas.microsoft.com/office/drawing/2014/main" id="{89F58DFA-CFF3-D5C1-7D00-A4A79A03A1A6}"/>
+              </a:ext>
+            </a:extLst>
+          </p:cNvPr>
+          <p:cNvSpPr/>
+          <p:nvPr/>
+        </p:nvSpPr>
+        <p:spPr>
+          <a:xfrm>
+            <a:off x="0" y="0"/>
+            <a:ext cx="12192000" cy="6858000"/>
+          </a:xfrm>
+          <a:prstGeom prst="rect">
+            <a:avLst/>
+          </a:prstGeom>
+        </p:spPr>
+        <p:style>
+          <a:lnRef idx="1">
+            <a:schemeClr val="accent3"/>
+          </a:lnRef>
+          <a:fillRef idx="2">
+            <a:schemeClr val="accent3"/>
+          </a:fillRef>
+          <a:effectRef idx="1">
+            <a:schemeClr val="accent3"/>
+          </a:effectRef>
+          <a:fontRef idx="minor">
+            <a:schemeClr val="dk1"/>
+          </a:fontRef>
+        </p:style>
+        <p:txBody>
+          <a:bodyPr rtlCol="0" anchor="ctr"/>
+          <a:lstStyle/>
+          <a:p>
+            <a:pPr algn="ctr"/>
+            <a:endParaRPr lang="pt-BR" dirty="0"/>
+          </a:p>
+        </p:txBody>
+      </p:sp>
+      <p:sp>
+        <p:nvSpPr>
+          <p:cNvPr id="9" name="Retângulo 8">
+            <a:extLst>
+              <a:ext uri="{FF2B5EF4-FFF2-40B4-BE49-F238E27FC236}">
+                <a16:creationId xmlns:a16="http://schemas.microsoft.com/office/drawing/2014/main" id="{9BCD9B27-E647-F593-EB4D-E74C2BAC908A}"/>
+              </a:ext>
+            </a:extLst>
+          </p:cNvPr>
+          <p:cNvSpPr/>
+          <p:nvPr/>
+        </p:nvSpPr>
+        <p:spPr>
+          <a:xfrm>
+            <a:off x="4559193" y="1394439"/>
+            <a:ext cx="4087266" cy="3011714"/>
+          </a:xfrm>
+          <a:prstGeom prst="rect">
+            <a:avLst/>
+          </a:prstGeom>
+          <a:solidFill>
+            <a:schemeClr val="bg1"/>
+          </a:solidFill>
+        </p:spPr>
+        <p:style>
+          <a:lnRef idx="1">
+            <a:schemeClr val="accent3"/>
+          </a:lnRef>
+          <a:fillRef idx="2">
+            <a:schemeClr val="accent3"/>
+          </a:fillRef>
+          <a:effectRef idx="1">
+            <a:schemeClr val="accent3"/>
+          </a:effectRef>
+          <a:fontRef idx="minor">
+            <a:schemeClr val="dk1"/>
+          </a:fontRef>
+        </p:style>
+        <p:txBody>
+          <a:bodyPr rtlCol="0" anchor="ctr"/>
+          <a:lstStyle/>
+          <a:p>
+            <a:pPr algn="ctr"/>
+            <a:endParaRPr lang="pt-BR"/>
+          </a:p>
+        </p:txBody>
+      </p:sp>
+      <p:sp>
+        <p:nvSpPr>
+          <p:cNvPr id="10" name="Retângulo 9">
+            <a:extLst>
+              <a:ext uri="{FF2B5EF4-FFF2-40B4-BE49-F238E27FC236}">
+                <a16:creationId xmlns:a16="http://schemas.microsoft.com/office/drawing/2014/main" id="{9E49CC9D-5B39-E0C8-650C-8E1D7F17833C}"/>
+              </a:ext>
+            </a:extLst>
+          </p:cNvPr>
+          <p:cNvSpPr/>
+          <p:nvPr/>
+        </p:nvSpPr>
+        <p:spPr>
+          <a:xfrm>
+            <a:off x="6055995" y="1721224"/>
+            <a:ext cx="2707497" cy="2487279"/>
+          </a:xfrm>
+          <a:prstGeom prst="rect">
+            <a:avLst/>
+          </a:prstGeom>
+          <a:noFill/>
+          <a:ln>
+            <a:noFill/>
+          </a:ln>
+        </p:spPr>
+        <p:style>
+          <a:lnRef idx="1">
+            <a:schemeClr val="accent3"/>
+          </a:lnRef>
+          <a:fillRef idx="2">
+            <a:schemeClr val="accent3"/>
+          </a:fillRef>
+          <a:effectRef idx="1">
+            <a:schemeClr val="accent3"/>
+          </a:effectRef>
+          <a:fontRef idx="minor">
+            <a:schemeClr val="dk1"/>
+          </a:fontRef>
+        </p:style>
+        <p:txBody>
+          <a:bodyPr rtlCol="0" anchor="ctr"/>
+          <a:lstStyle/>
+          <a:p>
+            <a:pPr algn="l"/>
+            <a:r>
+              <a:rPr lang="pt-BR" sz="1400" b="1" i="0" dirty="0">
+                <a:solidFill>
+                  <a:srgbClr val="000000"/>
+                </a:solidFill>
+                <a:effectLst/>
+                <a:latin typeface="Montserrat" panose="00000500000000000000" pitchFamily="2" charset="0"/>
+              </a:rPr>
+              <a:t>Nome: Henrique Nogueira Cambraia</a:t>
+            </a:r>
+          </a:p>
+          <a:p>
+            <a:pPr algn="l"/>
+            <a:r>
+              <a:rPr lang="pt-BR" sz="1400" b="1" i="0" dirty="0">
+                <a:solidFill>
+                  <a:srgbClr val="000000"/>
+                </a:solidFill>
+                <a:effectLst/>
+                <a:latin typeface="Montserrat" panose="00000500000000000000" pitchFamily="2" charset="0"/>
+              </a:rPr>
+              <a:t>Login: </a:t>
+            </a:r>
+            <a:r>
+              <a:rPr lang="pt-BR" sz="1400" b="1" i="0" dirty="0" err="1">
+                <a:solidFill>
+                  <a:srgbClr val="000000"/>
+                </a:solidFill>
+                <a:effectLst/>
+                <a:latin typeface="Montserrat" panose="00000500000000000000" pitchFamily="2" charset="0"/>
+              </a:rPr>
+              <a:t>hncambraia</a:t>
+            </a:r>
+            <a:endParaRPr lang="pt-BR" sz="1400" b="1" i="0" dirty="0">
+              <a:solidFill>
+                <a:srgbClr val="000000"/>
+              </a:solidFill>
+              <a:effectLst/>
+              <a:latin typeface="Montserrat" panose="00000500000000000000" pitchFamily="2" charset="0"/>
+            </a:endParaRPr>
+          </a:p>
+          <a:p>
+            <a:pPr algn="l"/>
+            <a:r>
+              <a:rPr lang="pt-BR" sz="1400" b="1" i="0" dirty="0">
+                <a:solidFill>
+                  <a:srgbClr val="000000"/>
+                </a:solidFill>
+                <a:effectLst/>
+                <a:latin typeface="Montserrat" panose="00000500000000000000" pitchFamily="2" charset="0"/>
+              </a:rPr>
+              <a:t>E-mail: hncambraia@gmail.com</a:t>
+            </a:r>
+          </a:p>
+          <a:p>
+            <a:pPr algn="l"/>
+            <a:r>
+              <a:rPr lang="pt-BR" sz="1400" b="1" i="0" dirty="0" err="1">
+                <a:solidFill>
+                  <a:srgbClr val="000000"/>
+                </a:solidFill>
+                <a:effectLst/>
+                <a:latin typeface="Montserrat" panose="00000500000000000000" pitchFamily="2" charset="0"/>
+              </a:rPr>
+              <a:t>Bio</a:t>
+            </a:r>
+            <a:r>
+              <a:rPr lang="pt-BR" sz="1400" b="1" i="0" dirty="0">
+                <a:solidFill>
+                  <a:srgbClr val="000000"/>
+                </a:solidFill>
+                <a:effectLst/>
+                <a:latin typeface="Montserrat" panose="00000500000000000000" pitchFamily="2" charset="0"/>
+              </a:rPr>
+              <a:t>: </a:t>
+            </a:r>
+            <a:r>
+              <a:rPr lang="pt-BR" sz="1400" b="1" i="0" dirty="0" err="1">
+                <a:solidFill>
+                  <a:srgbClr val="000000"/>
+                </a:solidFill>
+                <a:effectLst/>
+                <a:latin typeface="Montserrat" panose="00000500000000000000" pitchFamily="2" charset="0"/>
+              </a:rPr>
+              <a:t>henrique</a:t>
+            </a:r>
+            <a:r>
+              <a:rPr lang="pt-BR" sz="1400" b="1" i="0" dirty="0">
+                <a:solidFill>
+                  <a:srgbClr val="000000"/>
+                </a:solidFill>
+                <a:effectLst/>
+                <a:latin typeface="Montserrat" panose="00000500000000000000" pitchFamily="2" charset="0"/>
+              </a:rPr>
+              <a:t> nogueira</a:t>
+            </a:r>
+          </a:p>
+          <a:p>
+            <a:br>
+              <a:rPr lang="pt-BR" sz="1400" dirty="0"/>
+            </a:br>
+            <a:endParaRPr lang="pt-BR" sz="1400" dirty="0"/>
+          </a:p>
+        </p:txBody>
+      </p:sp>
       <p:grpSp>
         <p:nvGrpSpPr>
           <p:cNvPr id="31" name="Agrupar 30">
@@ -4448,8 +5496,8 @@
         </p:nvGrpSpPr>
         <p:grpSpPr>
           <a:xfrm>
-            <a:off x="3142347" y="1144497"/>
-            <a:ext cx="631368" cy="631368"/>
+            <a:off x="4676226" y="1971169"/>
+            <a:ext cx="1379768" cy="1881092"/>
             <a:chOff x="836706" y="1205325"/>
             <a:chExt cx="1251218" cy="1251218"/>
           </a:xfrm>
@@ -4515,201 +5563,13 @@
             <p:nvPr/>
           </p:nvPicPr>
           <p:blipFill>
-            <a:blip r:embed="rId6">
+            <a:blip r:embed="rId2">
               <a:extLst>
                 <a:ext uri="{28A0092B-C50C-407E-A947-70E740481C1C}">
                   <a14:useLocalDpi xmlns:a14="http://schemas.microsoft.com/office/drawing/2010/main" val="0"/>
                 </a:ext>
                 <a:ext uri="{96DAC541-7B7A-43D3-8B79-37D633B846F1}">
-                  <asvg:svgBlip xmlns:asvg="http://schemas.microsoft.com/office/drawing/2016/SVG/main" r:embed="rId7"/>
-                </a:ext>
-              </a:extLst>
-            </a:blip>
-            <a:stretch>
-              <a:fillRect/>
-            </a:stretch>
-          </p:blipFill>
-          <p:spPr>
-            <a:xfrm>
-              <a:off x="1074059" y="1302613"/>
-              <a:ext cx="783774" cy="1056642"/>
-            </a:xfrm>
-            <a:prstGeom prst="rect">
-              <a:avLst/>
-            </a:prstGeom>
-          </p:spPr>
-        </p:pic>
-      </p:grpSp>
-      <p:sp>
-        <p:nvSpPr>
-          <p:cNvPr id="35" name="Retângulo: Cantos Arredondados 34">
-            <a:extLst>
-              <a:ext uri="{FF2B5EF4-FFF2-40B4-BE49-F238E27FC236}">
-                <a16:creationId xmlns:a16="http://schemas.microsoft.com/office/drawing/2014/main" id="{98030798-2852-BFD1-2091-616D19C8A300}"/>
-              </a:ext>
-            </a:extLst>
-          </p:cNvPr>
-          <p:cNvSpPr/>
-          <p:nvPr/>
-        </p:nvSpPr>
-        <p:spPr>
-          <a:xfrm>
-            <a:off x="3962403" y="1205325"/>
-            <a:ext cx="6701116" cy="521448"/>
-          </a:xfrm>
-          <a:prstGeom prst="roundRect">
-            <a:avLst>
-              <a:gd name="adj" fmla="val 44493"/>
-            </a:avLst>
-          </a:prstGeom>
-        </p:spPr>
-        <p:style>
-          <a:lnRef idx="2">
-            <a:schemeClr val="accent1"/>
-          </a:lnRef>
-          <a:fillRef idx="1">
-            <a:schemeClr val="lt1"/>
-          </a:fillRef>
-          <a:effectRef idx="0">
-            <a:schemeClr val="accent1"/>
-          </a:effectRef>
-          <a:fontRef idx="minor">
-            <a:schemeClr val="dk1"/>
-          </a:fontRef>
-        </p:style>
-        <p:txBody>
-          <a:bodyPr rtlCol="0" anchor="ctr"/>
-          <a:lstStyle/>
-          <a:p>
-            <a:pPr algn="ctr"/>
-            <a:endParaRPr lang="pt-BR"/>
-          </a:p>
-        </p:txBody>
-      </p:sp>
-      <p:pic>
-        <p:nvPicPr>
-          <p:cNvPr id="3" name="Imagem 2" descr="Logotipo, nome da empresa&#10;&#10;Descrição gerada automaticamente">
-            <a:extLst>
-              <a:ext uri="{FF2B5EF4-FFF2-40B4-BE49-F238E27FC236}">
-                <a16:creationId xmlns:a16="http://schemas.microsoft.com/office/drawing/2014/main" id="{A54EDF3D-2D17-FEC8-E9C8-3F1243EEA83E}"/>
-              </a:ext>
-            </a:extLst>
-          </p:cNvPr>
-          <p:cNvPicPr>
-            <a:picLocks noChangeAspect="1"/>
-          </p:cNvPicPr>
-          <p:nvPr/>
-        </p:nvPicPr>
-        <p:blipFill>
-          <a:blip r:embed="rId8">
-            <a:extLst>
-              <a:ext uri="{28A0092B-C50C-407E-A947-70E740481C1C}">
-                <a14:useLocalDpi xmlns:a14="http://schemas.microsoft.com/office/drawing/2010/main" val="0"/>
-              </a:ext>
-            </a:extLst>
-          </a:blip>
-          <a:stretch>
-            <a:fillRect/>
-          </a:stretch>
-        </p:blipFill>
-        <p:spPr>
-          <a:xfrm>
-            <a:off x="273973" y="123158"/>
-            <a:ext cx="453541" cy="453541"/>
-          </a:xfrm>
-          <a:prstGeom prst="rect">
-            <a:avLst/>
-          </a:prstGeom>
-        </p:spPr>
-      </p:pic>
-      <p:grpSp>
-        <p:nvGrpSpPr>
-          <p:cNvPr id="26" name="Agrupar 25">
-            <a:extLst>
-              <a:ext uri="{FF2B5EF4-FFF2-40B4-BE49-F238E27FC236}">
-                <a16:creationId xmlns:a16="http://schemas.microsoft.com/office/drawing/2014/main" id="{8FF5C318-CDB9-5DFE-30CD-C910B4CFE71A}"/>
-              </a:ext>
-            </a:extLst>
-          </p:cNvPr>
-          <p:cNvGrpSpPr/>
-          <p:nvPr/>
-        </p:nvGrpSpPr>
-        <p:grpSpPr>
-          <a:xfrm>
-            <a:off x="7525975" y="-17625"/>
-            <a:ext cx="650584" cy="650584"/>
-            <a:chOff x="836706" y="1205325"/>
-            <a:chExt cx="1251218" cy="1251218"/>
-          </a:xfrm>
-        </p:grpSpPr>
-        <p:sp>
-          <p:nvSpPr>
-            <p:cNvPr id="34" name="Elipse 33">
-              <a:extLst>
-                <a:ext uri="{FF2B5EF4-FFF2-40B4-BE49-F238E27FC236}">
-                  <a16:creationId xmlns:a16="http://schemas.microsoft.com/office/drawing/2014/main" id="{79724435-EEC3-B039-1EC5-7C62B2676668}"/>
-                </a:ext>
-              </a:extLst>
-            </p:cNvPr>
-            <p:cNvSpPr/>
-            <p:nvPr/>
-          </p:nvSpPr>
-          <p:spPr>
-            <a:xfrm>
-              <a:off x="836706" y="1205325"/>
-              <a:ext cx="1251218" cy="1251218"/>
-            </a:xfrm>
-            <a:prstGeom prst="ellipse">
-              <a:avLst/>
-            </a:prstGeom>
-          </p:spPr>
-          <p:style>
-            <a:lnRef idx="2">
-              <a:schemeClr val="accent1">
-                <a:shade val="50000"/>
-              </a:schemeClr>
-            </a:lnRef>
-            <a:fillRef idx="1">
-              <a:schemeClr val="accent1"/>
-            </a:fillRef>
-            <a:effectRef idx="0">
-              <a:schemeClr val="accent1"/>
-            </a:effectRef>
-            <a:fontRef idx="minor">
-              <a:schemeClr val="lt1"/>
-            </a:fontRef>
-          </p:style>
-          <p:txBody>
-            <a:bodyPr rtlCol="0" anchor="ctr"/>
-            <a:lstStyle/>
-            <a:p>
-              <a:pPr algn="r"/>
-              <a:endParaRPr lang="pt-BR" dirty="0"/>
-            </a:p>
-          </p:txBody>
-        </p:sp>
-        <p:pic>
-          <p:nvPicPr>
-            <p:cNvPr id="36" name="Gráfico 35" descr="Homem usando um moletom">
-              <a:extLst>
-                <a:ext uri="{FF2B5EF4-FFF2-40B4-BE49-F238E27FC236}">
-                  <a16:creationId xmlns:a16="http://schemas.microsoft.com/office/drawing/2014/main" id="{DFA172EC-BB8A-B46C-66D4-F09D700A2EF0}"/>
-                </a:ext>
-              </a:extLst>
-            </p:cNvPr>
-            <p:cNvPicPr>
-              <a:picLocks noChangeAspect="1"/>
-            </p:cNvPicPr>
-            <p:nvPr/>
-          </p:nvPicPr>
-          <p:blipFill>
-            <a:blip r:embed="rId6">
-              <a:extLst>
-                <a:ext uri="{28A0092B-C50C-407E-A947-70E740481C1C}">
-                  <a14:useLocalDpi xmlns:a14="http://schemas.microsoft.com/office/drawing/2010/main" val="0"/>
-                </a:ext>
-                <a:ext uri="{96DAC541-7B7A-43D3-8B79-37D633B846F1}">
-                  <asvg:svgBlip xmlns:asvg="http://schemas.microsoft.com/office/drawing/2016/SVG/main" r:embed="rId7"/>
+                  <asvg:svgBlip xmlns:asvg="http://schemas.microsoft.com/office/drawing/2016/SVG/main" r:embed="rId3"/>
                 </a:ext>
               </a:extLst>
             </a:blip>
@@ -4730,10 +5590,10 @@
       </p:grpSp>
       <p:pic>
         <p:nvPicPr>
-          <p:cNvPr id="37" name="Gráfico 36" descr="Renovação (Casa com faíscas) com preenchimento sólido">
-            <a:extLst>
-              <a:ext uri="{FF2B5EF4-FFF2-40B4-BE49-F238E27FC236}">
-                <a16:creationId xmlns:a16="http://schemas.microsoft.com/office/drawing/2014/main" id="{6094182B-C294-C364-C530-A80A3829746D}"/>
+          <p:cNvPr id="4" name="Imagem 3">
+            <a:extLst>
+              <a:ext uri="{FF2B5EF4-FFF2-40B4-BE49-F238E27FC236}">
+                <a16:creationId xmlns:a16="http://schemas.microsoft.com/office/drawing/2014/main" id="{628ABD37-FF91-C0AB-8829-F00B4696259D}"/>
               </a:ext>
             </a:extLst>
           </p:cNvPr>
@@ -4743,426 +5603,15 @@
           <p:nvPr/>
         </p:nvPicPr>
         <p:blipFill>
-          <a:blip r:embed="rId2">
-            <a:extLst>
-              <a:ext uri="{28A0092B-C50C-407E-A947-70E740481C1C}">
-                <a14:useLocalDpi xmlns:a14="http://schemas.microsoft.com/office/drawing/2010/main" val="0"/>
-              </a:ext>
-              <a:ext uri="{96DAC541-7B7A-43D3-8B79-37D633B846F1}">
-                <asvg:svgBlip xmlns:asvg="http://schemas.microsoft.com/office/drawing/2016/SVG/main" r:embed="rId3"/>
-              </a:ext>
-            </a:extLst>
-          </a:blip>
+          <a:blip r:embed="rId4"/>
           <a:stretch>
             <a:fillRect/>
           </a:stretch>
         </p:blipFill>
         <p:spPr>
           <a:xfrm>
-            <a:off x="11472476" y="139168"/>
-            <a:ext cx="428172" cy="428172"/>
-          </a:xfrm>
-          <a:prstGeom prst="rect">
-            <a:avLst/>
-          </a:prstGeom>
-        </p:spPr>
-      </p:pic>
-    </p:spTree>
-    <p:extLst>
-      <p:ext uri="{BB962C8B-B14F-4D97-AF65-F5344CB8AC3E}">
-        <p14:creationId xmlns:p14="http://schemas.microsoft.com/office/powerpoint/2010/main" val="2686754018"/>
-      </p:ext>
-    </p:extLst>
-  </p:cSld>
-  <p:clrMapOvr>
-    <a:masterClrMapping/>
-  </p:clrMapOvr>
-</p:sld>
-</file>
-
-<file path=ppt/slides/slide3.xml><?xml version="1.0" encoding="utf-8"?>
-<p:sld xmlns:a="http://schemas.openxmlformats.org/drawingml/2006/main" xmlns:r="http://schemas.openxmlformats.org/officeDocument/2006/relationships" xmlns:p="http://schemas.openxmlformats.org/presentationml/2006/main">
-  <p:cSld>
-    <p:spTree>
-      <p:nvGrpSpPr>
-        <p:cNvPr id="1" name=""/>
-        <p:cNvGrpSpPr/>
-        <p:nvPr/>
-      </p:nvGrpSpPr>
-      <p:grpSpPr>
-        <a:xfrm>
-          <a:off x="0" y="0"/>
-          <a:ext cx="0" cy="0"/>
-          <a:chOff x="0" y="0"/>
-          <a:chExt cx="0" cy="0"/>
-        </a:xfrm>
-      </p:grpSpPr>
-      <p:sp>
-        <p:nvSpPr>
-          <p:cNvPr id="6" name="Retângulo 5">
-            <a:extLst>
-              <a:ext uri="{FF2B5EF4-FFF2-40B4-BE49-F238E27FC236}">
-                <a16:creationId xmlns:a16="http://schemas.microsoft.com/office/drawing/2014/main" id="{89F58DFA-CFF3-D5C1-7D00-A4A79A03A1A6}"/>
-              </a:ext>
-            </a:extLst>
-          </p:cNvPr>
-          <p:cNvSpPr/>
-          <p:nvPr/>
-        </p:nvSpPr>
-        <p:spPr>
-          <a:xfrm>
-            <a:off x="0" y="0"/>
-            <a:ext cx="12192000" cy="6858000"/>
-          </a:xfrm>
-          <a:prstGeom prst="rect">
-            <a:avLst/>
-          </a:prstGeom>
-        </p:spPr>
-        <p:style>
-          <a:lnRef idx="1">
-            <a:schemeClr val="accent3"/>
-          </a:lnRef>
-          <a:fillRef idx="2">
-            <a:schemeClr val="accent3"/>
-          </a:fillRef>
-          <a:effectRef idx="1">
-            <a:schemeClr val="accent3"/>
-          </a:effectRef>
-          <a:fontRef idx="minor">
-            <a:schemeClr val="dk1"/>
-          </a:fontRef>
-        </p:style>
-        <p:txBody>
-          <a:bodyPr rtlCol="0" anchor="ctr"/>
-          <a:lstStyle/>
-          <a:p>
-            <a:pPr algn="ctr"/>
-            <a:endParaRPr lang="pt-BR" dirty="0"/>
-          </a:p>
-        </p:txBody>
-      </p:sp>
-      <p:sp>
-        <p:nvSpPr>
-          <p:cNvPr id="7" name="Retângulo 6">
-            <a:extLst>
-              <a:ext uri="{FF2B5EF4-FFF2-40B4-BE49-F238E27FC236}">
-                <a16:creationId xmlns:a16="http://schemas.microsoft.com/office/drawing/2014/main" id="{B95AFAFF-702C-65A8-8236-263B52FB0E06}"/>
-              </a:ext>
-            </a:extLst>
-          </p:cNvPr>
-          <p:cNvSpPr/>
-          <p:nvPr/>
-        </p:nvSpPr>
-        <p:spPr>
-          <a:xfrm>
-            <a:off x="0" y="0"/>
-            <a:ext cx="12192000" cy="735106"/>
-          </a:xfrm>
-          <a:prstGeom prst="rect">
-            <a:avLst/>
-          </a:prstGeom>
-          <a:solidFill>
-            <a:schemeClr val="bg1"/>
-          </a:solidFill>
-        </p:spPr>
-        <p:style>
-          <a:lnRef idx="1">
-            <a:schemeClr val="accent3"/>
-          </a:lnRef>
-          <a:fillRef idx="2">
-            <a:schemeClr val="accent3"/>
-          </a:fillRef>
-          <a:effectRef idx="1">
-            <a:schemeClr val="accent3"/>
-          </a:effectRef>
-          <a:fontRef idx="minor">
-            <a:schemeClr val="dk1"/>
-          </a:fontRef>
-        </p:style>
-        <p:txBody>
-          <a:bodyPr rtlCol="0" anchor="ctr"/>
-          <a:lstStyle/>
-          <a:p>
-            <a:pPr algn="ctr"/>
-            <a:endParaRPr lang="pt-BR"/>
-          </a:p>
-        </p:txBody>
-      </p:sp>
-      <p:sp>
-        <p:nvSpPr>
-          <p:cNvPr id="9" name="Retângulo 8">
-            <a:extLst>
-              <a:ext uri="{FF2B5EF4-FFF2-40B4-BE49-F238E27FC236}">
-                <a16:creationId xmlns:a16="http://schemas.microsoft.com/office/drawing/2014/main" id="{9BCD9B27-E647-F593-EB4D-E74C2BAC908A}"/>
-              </a:ext>
-            </a:extLst>
-          </p:cNvPr>
-          <p:cNvSpPr/>
-          <p:nvPr/>
-        </p:nvSpPr>
-        <p:spPr>
-          <a:xfrm>
-            <a:off x="4559193" y="1394439"/>
-            <a:ext cx="4087266" cy="3011714"/>
-          </a:xfrm>
-          <a:prstGeom prst="rect">
-            <a:avLst/>
-          </a:prstGeom>
-          <a:solidFill>
-            <a:schemeClr val="bg1"/>
-          </a:solidFill>
-        </p:spPr>
-        <p:style>
-          <a:lnRef idx="1">
-            <a:schemeClr val="accent3"/>
-          </a:lnRef>
-          <a:fillRef idx="2">
-            <a:schemeClr val="accent3"/>
-          </a:fillRef>
-          <a:effectRef idx="1">
-            <a:schemeClr val="accent3"/>
-          </a:effectRef>
-          <a:fontRef idx="minor">
-            <a:schemeClr val="dk1"/>
-          </a:fontRef>
-        </p:style>
-        <p:txBody>
-          <a:bodyPr rtlCol="0" anchor="ctr"/>
-          <a:lstStyle/>
-          <a:p>
-            <a:pPr algn="ctr"/>
-            <a:endParaRPr lang="pt-BR"/>
-          </a:p>
-        </p:txBody>
-      </p:sp>
-      <p:sp>
-        <p:nvSpPr>
-          <p:cNvPr id="10" name="Retângulo 9">
-            <a:extLst>
-              <a:ext uri="{FF2B5EF4-FFF2-40B4-BE49-F238E27FC236}">
-                <a16:creationId xmlns:a16="http://schemas.microsoft.com/office/drawing/2014/main" id="{9E49CC9D-5B39-E0C8-650C-8E1D7F17833C}"/>
-              </a:ext>
-            </a:extLst>
-          </p:cNvPr>
-          <p:cNvSpPr/>
-          <p:nvPr/>
-        </p:nvSpPr>
-        <p:spPr>
-          <a:xfrm>
-            <a:off x="5713105" y="1971169"/>
-            <a:ext cx="2445658" cy="2237334"/>
-          </a:xfrm>
-          <a:prstGeom prst="rect">
-            <a:avLst/>
-          </a:prstGeom>
-          <a:solidFill>
-            <a:schemeClr val="bg1"/>
-          </a:solidFill>
-        </p:spPr>
-        <p:style>
-          <a:lnRef idx="1">
-            <a:schemeClr val="accent3"/>
-          </a:lnRef>
-          <a:fillRef idx="2">
-            <a:schemeClr val="accent3"/>
-          </a:fillRef>
-          <a:effectRef idx="1">
-            <a:schemeClr val="accent3"/>
-          </a:effectRef>
-          <a:fontRef idx="minor">
-            <a:schemeClr val="dk1"/>
-          </a:fontRef>
-        </p:style>
-        <p:txBody>
-          <a:bodyPr rtlCol="0" anchor="ctr"/>
-          <a:lstStyle/>
-          <a:p>
-            <a:pPr algn="l"/>
-            <a:r>
-              <a:rPr lang="pt-BR" b="1" i="0" dirty="0">
-                <a:solidFill>
-                  <a:srgbClr val="000000"/>
-                </a:solidFill>
-                <a:effectLst/>
-                <a:latin typeface="Times New Roman" panose="02020603050405020304" pitchFamily="18" charset="0"/>
-              </a:rPr>
-              <a:t>Nome: Henrique Nogueira Cambraia</a:t>
-            </a:r>
-          </a:p>
-          <a:p>
-            <a:pPr algn="l"/>
-            <a:r>
-              <a:rPr lang="pt-BR" b="1" i="0" dirty="0">
-                <a:solidFill>
-                  <a:srgbClr val="000000"/>
-                </a:solidFill>
-                <a:effectLst/>
-                <a:latin typeface="Times New Roman" panose="02020603050405020304" pitchFamily="18" charset="0"/>
-              </a:rPr>
-              <a:t>Login: </a:t>
-            </a:r>
-            <a:r>
-              <a:rPr lang="pt-BR" b="1" i="0" dirty="0" err="1">
-                <a:solidFill>
-                  <a:srgbClr val="000000"/>
-                </a:solidFill>
-                <a:effectLst/>
-                <a:latin typeface="Times New Roman" panose="02020603050405020304" pitchFamily="18" charset="0"/>
-              </a:rPr>
-              <a:t>hncambraia</a:t>
-            </a:r>
-            <a:endParaRPr lang="pt-BR" b="1" i="0" dirty="0">
-              <a:solidFill>
-                <a:srgbClr val="000000"/>
-              </a:solidFill>
-              <a:effectLst/>
-              <a:latin typeface="Times New Roman" panose="02020603050405020304" pitchFamily="18" charset="0"/>
-            </a:endParaRPr>
-          </a:p>
-          <a:p>
-            <a:pPr algn="l"/>
-            <a:r>
-              <a:rPr lang="pt-BR" b="1" i="0" dirty="0">
-                <a:solidFill>
-                  <a:srgbClr val="000000"/>
-                </a:solidFill>
-                <a:effectLst/>
-                <a:latin typeface="Times New Roman" panose="02020603050405020304" pitchFamily="18" charset="0"/>
-              </a:rPr>
-              <a:t>E-mail: hncambraia@gmail.com</a:t>
-            </a:r>
-          </a:p>
-          <a:p>
-            <a:pPr algn="l"/>
-            <a:r>
-              <a:rPr lang="pt-BR" b="1" i="0" dirty="0" err="1">
-                <a:solidFill>
-                  <a:srgbClr val="000000"/>
-                </a:solidFill>
-                <a:effectLst/>
-                <a:latin typeface="Times New Roman" panose="02020603050405020304" pitchFamily="18" charset="0"/>
-              </a:rPr>
-              <a:t>Bio</a:t>
-            </a:r>
-            <a:r>
-              <a:rPr lang="pt-BR" b="1" i="0" dirty="0">
-                <a:solidFill>
-                  <a:srgbClr val="000000"/>
-                </a:solidFill>
-                <a:effectLst/>
-                <a:latin typeface="Times New Roman" panose="02020603050405020304" pitchFamily="18" charset="0"/>
-              </a:rPr>
-              <a:t>: </a:t>
-            </a:r>
-            <a:r>
-              <a:rPr lang="pt-BR" b="1" i="0" dirty="0" err="1">
-                <a:solidFill>
-                  <a:srgbClr val="000000"/>
-                </a:solidFill>
-                <a:effectLst/>
-                <a:latin typeface="Times New Roman" panose="02020603050405020304" pitchFamily="18" charset="0"/>
-              </a:rPr>
-              <a:t>henrique</a:t>
-            </a:r>
-            <a:r>
-              <a:rPr lang="pt-BR" b="1" i="0" dirty="0">
-                <a:solidFill>
-                  <a:srgbClr val="000000"/>
-                </a:solidFill>
-                <a:effectLst/>
-                <a:latin typeface="Times New Roman" panose="02020603050405020304" pitchFamily="18" charset="0"/>
-              </a:rPr>
-              <a:t> nogueira</a:t>
-            </a:r>
-          </a:p>
-          <a:p>
-            <a:br>
-              <a:rPr lang="pt-BR" dirty="0"/>
-            </a:br>
-            <a:endParaRPr lang="pt-BR" dirty="0"/>
-          </a:p>
-        </p:txBody>
-      </p:sp>
-      <p:sp>
-        <p:nvSpPr>
-          <p:cNvPr id="17" name="Retângulo 16">
-            <a:extLst>
-              <a:ext uri="{FF2B5EF4-FFF2-40B4-BE49-F238E27FC236}">
-                <a16:creationId xmlns:a16="http://schemas.microsoft.com/office/drawing/2014/main" id="{B852A2E4-B857-4ECD-F99E-C81053476EF5}"/>
-              </a:ext>
-            </a:extLst>
-          </p:cNvPr>
-          <p:cNvSpPr/>
-          <p:nvPr/>
-        </p:nvSpPr>
-        <p:spPr>
-          <a:xfrm>
-            <a:off x="1001487" y="108858"/>
-            <a:ext cx="3976913" cy="519954"/>
-          </a:xfrm>
-          <a:prstGeom prst="rect">
-            <a:avLst/>
-          </a:prstGeom>
-          <a:solidFill>
-            <a:schemeClr val="bg1"/>
-          </a:solidFill>
-        </p:spPr>
-        <p:style>
-          <a:lnRef idx="1">
-            <a:schemeClr val="accent3"/>
-          </a:lnRef>
-          <a:fillRef idx="2">
-            <a:schemeClr val="accent3"/>
-          </a:fillRef>
-          <a:effectRef idx="1">
-            <a:schemeClr val="accent3"/>
-          </a:effectRef>
-          <a:fontRef idx="minor">
-            <a:schemeClr val="dk1"/>
-          </a:fontRef>
-        </p:style>
-        <p:txBody>
-          <a:bodyPr rtlCol="0" anchor="ctr"/>
-          <a:lstStyle/>
-          <a:p>
-            <a:pPr algn="ctr"/>
-            <a:endParaRPr lang="pt-BR"/>
-          </a:p>
-        </p:txBody>
-      </p:sp>
-      <p:pic>
-        <p:nvPicPr>
-          <p:cNvPr id="19" name="Gráfico 18" descr="Renovação (Casa com faíscas) com preenchimento sólido">
-            <a:extLst>
-              <a:ext uri="{FF2B5EF4-FFF2-40B4-BE49-F238E27FC236}">
-                <a16:creationId xmlns:a16="http://schemas.microsoft.com/office/drawing/2014/main" id="{5ABB23BD-D746-7A22-9E58-FFA9FCC035EA}"/>
-              </a:ext>
-            </a:extLst>
-          </p:cNvPr>
-          <p:cNvPicPr>
-            <a:picLocks noChangeAspect="1"/>
-          </p:cNvPicPr>
-          <p:nvPr/>
-        </p:nvPicPr>
-        <p:blipFill>
-          <a:blip r:embed="rId2">
-            <a:extLst>
-              <a:ext uri="{28A0092B-C50C-407E-A947-70E740481C1C}">
-                <a14:useLocalDpi xmlns:a14="http://schemas.microsoft.com/office/drawing/2010/main" val="0"/>
-              </a:ext>
-              <a:ext uri="{96DAC541-7B7A-43D3-8B79-37D633B846F1}">
-                <asvg:svgBlip xmlns:asvg="http://schemas.microsoft.com/office/drawing/2016/SVG/main" r:embed="rId3"/>
-              </a:ext>
-            </a:extLst>
-          </a:blip>
-          <a:stretch>
-            <a:fillRect/>
-          </a:stretch>
-        </p:blipFill>
-        <p:spPr>
-          <a:xfrm>
-            <a:off x="6884789" y="135842"/>
-            <a:ext cx="428172" cy="428172"/>
+            <a:off x="0" y="-81306"/>
+            <a:ext cx="12192000" cy="545911"/>
           </a:xfrm>
           <a:prstGeom prst="rect">
             <a:avLst/>
@@ -5171,10 +5620,10 @@
       </p:pic>
       <p:pic>
         <p:nvPicPr>
-          <p:cNvPr id="24" name="Gráfico 23" descr="Lupa estrutura de tópicos">
-            <a:extLst>
-              <a:ext uri="{FF2B5EF4-FFF2-40B4-BE49-F238E27FC236}">
-                <a16:creationId xmlns:a16="http://schemas.microsoft.com/office/drawing/2014/main" id="{9980DD59-5D39-4E0C-1EC2-3B28103B4DF0}"/>
+          <p:cNvPr id="8" name="Imagem 7">
+            <a:extLst>
+              <a:ext uri="{FF2B5EF4-FFF2-40B4-BE49-F238E27FC236}">
+                <a16:creationId xmlns:a16="http://schemas.microsoft.com/office/drawing/2014/main" id="{625938D4-D181-A24F-E813-2C1C56E2CF46}"/>
               </a:ext>
             </a:extLst>
           </p:cNvPr>
@@ -5184,373 +5633,21 @@
           <p:nvPr/>
         </p:nvPicPr>
         <p:blipFill>
-          <a:blip r:embed="rId4">
-            <a:extLst>
-              <a:ext uri="{28A0092B-C50C-407E-A947-70E740481C1C}">
-                <a14:useLocalDpi xmlns:a14="http://schemas.microsoft.com/office/drawing/2010/main" val="0"/>
-              </a:ext>
-              <a:ext uri="{96DAC541-7B7A-43D3-8B79-37D633B846F1}">
-                <asvg:svgBlip xmlns:asvg="http://schemas.microsoft.com/office/drawing/2016/SVG/main" r:embed="rId5"/>
-              </a:ext>
-            </a:extLst>
-          </a:blip>
+          <a:blip r:embed="rId5"/>
           <a:stretch>
             <a:fillRect/>
           </a:stretch>
         </p:blipFill>
         <p:spPr>
           <a:xfrm>
-            <a:off x="1081316" y="257417"/>
-            <a:ext cx="283028" cy="283028"/>
+            <a:off x="6602205" y="3825367"/>
+            <a:ext cx="600159" cy="333422"/>
           </a:xfrm>
           <a:prstGeom prst="rect">
             <a:avLst/>
           </a:prstGeom>
         </p:spPr>
       </p:pic>
-      <p:grpSp>
-        <p:nvGrpSpPr>
-          <p:cNvPr id="31" name="Agrupar 30">
-            <a:extLst>
-              <a:ext uri="{FF2B5EF4-FFF2-40B4-BE49-F238E27FC236}">
-                <a16:creationId xmlns:a16="http://schemas.microsoft.com/office/drawing/2014/main" id="{9731C1E3-C638-3CFC-AFAA-2E906DA34C81}"/>
-              </a:ext>
-            </a:extLst>
-          </p:cNvPr>
-          <p:cNvGrpSpPr/>
-          <p:nvPr/>
-        </p:nvGrpSpPr>
-        <p:grpSpPr>
-          <a:xfrm>
-            <a:off x="4961968" y="1655485"/>
-            <a:ext cx="631368" cy="631368"/>
-            <a:chOff x="836706" y="1205325"/>
-            <a:chExt cx="1251218" cy="1251218"/>
-          </a:xfrm>
-        </p:grpSpPr>
-        <p:sp>
-          <p:nvSpPr>
-            <p:cNvPr id="32" name="Elipse 31">
-              <a:extLst>
-                <a:ext uri="{FF2B5EF4-FFF2-40B4-BE49-F238E27FC236}">
-                  <a16:creationId xmlns:a16="http://schemas.microsoft.com/office/drawing/2014/main" id="{D6C252F4-FAD4-B803-8B20-F7EC31291740}"/>
-                </a:ext>
-              </a:extLst>
-            </p:cNvPr>
-            <p:cNvSpPr/>
-            <p:nvPr/>
-          </p:nvSpPr>
-          <p:spPr>
-            <a:xfrm>
-              <a:off x="836706" y="1205325"/>
-              <a:ext cx="1251218" cy="1251218"/>
-            </a:xfrm>
-            <a:prstGeom prst="ellipse">
-              <a:avLst/>
-            </a:prstGeom>
-          </p:spPr>
-          <p:style>
-            <a:lnRef idx="2">
-              <a:schemeClr val="accent1">
-                <a:shade val="50000"/>
-              </a:schemeClr>
-            </a:lnRef>
-            <a:fillRef idx="1">
-              <a:schemeClr val="accent1"/>
-            </a:fillRef>
-            <a:effectRef idx="0">
-              <a:schemeClr val="accent1"/>
-            </a:effectRef>
-            <a:fontRef idx="minor">
-              <a:schemeClr val="lt1"/>
-            </a:fontRef>
-          </p:style>
-          <p:txBody>
-            <a:bodyPr rtlCol="0" anchor="ctr"/>
-            <a:lstStyle/>
-            <a:p>
-              <a:pPr algn="r"/>
-              <a:endParaRPr lang="pt-BR" dirty="0"/>
-            </a:p>
-          </p:txBody>
-        </p:sp>
-        <p:pic>
-          <p:nvPicPr>
-            <p:cNvPr id="33" name="Gráfico 32" descr="Homem usando um moletom">
-              <a:extLst>
-                <a:ext uri="{FF2B5EF4-FFF2-40B4-BE49-F238E27FC236}">
-                  <a16:creationId xmlns:a16="http://schemas.microsoft.com/office/drawing/2014/main" id="{11289167-3865-9750-1EF7-8C8A45141182}"/>
-                </a:ext>
-              </a:extLst>
-            </p:cNvPr>
-            <p:cNvPicPr>
-              <a:picLocks noChangeAspect="1"/>
-            </p:cNvPicPr>
-            <p:nvPr/>
-          </p:nvPicPr>
-          <p:blipFill>
-            <a:blip r:embed="rId6">
-              <a:extLst>
-                <a:ext uri="{28A0092B-C50C-407E-A947-70E740481C1C}">
-                  <a14:useLocalDpi xmlns:a14="http://schemas.microsoft.com/office/drawing/2010/main" val="0"/>
-                </a:ext>
-                <a:ext uri="{96DAC541-7B7A-43D3-8B79-37D633B846F1}">
-                  <asvg:svgBlip xmlns:asvg="http://schemas.microsoft.com/office/drawing/2016/SVG/main" r:embed="rId7"/>
-                </a:ext>
-              </a:extLst>
-            </a:blip>
-            <a:stretch>
-              <a:fillRect/>
-            </a:stretch>
-          </p:blipFill>
-          <p:spPr>
-            <a:xfrm>
-              <a:off x="1074059" y="1302613"/>
-              <a:ext cx="783774" cy="1056642"/>
-            </a:xfrm>
-            <a:prstGeom prst="rect">
-              <a:avLst/>
-            </a:prstGeom>
-          </p:spPr>
-        </p:pic>
-      </p:grpSp>
-      <p:pic>
-        <p:nvPicPr>
-          <p:cNvPr id="3" name="Imagem 2" descr="Logotipo, nome da empresa&#10;&#10;Descrição gerada automaticamente">
-            <a:extLst>
-              <a:ext uri="{FF2B5EF4-FFF2-40B4-BE49-F238E27FC236}">
-                <a16:creationId xmlns:a16="http://schemas.microsoft.com/office/drawing/2014/main" id="{A54EDF3D-2D17-FEC8-E9C8-3F1243EEA83E}"/>
-              </a:ext>
-            </a:extLst>
-          </p:cNvPr>
-          <p:cNvPicPr>
-            <a:picLocks noChangeAspect="1"/>
-          </p:cNvPicPr>
-          <p:nvPr/>
-        </p:nvPicPr>
-        <p:blipFill>
-          <a:blip r:embed="rId8">
-            <a:extLst>
-              <a:ext uri="{28A0092B-C50C-407E-A947-70E740481C1C}">
-                <a14:useLocalDpi xmlns:a14="http://schemas.microsoft.com/office/drawing/2010/main" val="0"/>
-              </a:ext>
-            </a:extLst>
-          </a:blip>
-          <a:stretch>
-            <a:fillRect/>
-          </a:stretch>
-        </p:blipFill>
-        <p:spPr>
-          <a:xfrm>
-            <a:off x="273973" y="123158"/>
-            <a:ext cx="453541" cy="453541"/>
-          </a:xfrm>
-          <a:prstGeom prst="rect">
-            <a:avLst/>
-          </a:prstGeom>
-        </p:spPr>
-      </p:pic>
-      <p:grpSp>
-        <p:nvGrpSpPr>
-          <p:cNvPr id="26" name="Agrupar 25">
-            <a:extLst>
-              <a:ext uri="{FF2B5EF4-FFF2-40B4-BE49-F238E27FC236}">
-                <a16:creationId xmlns:a16="http://schemas.microsoft.com/office/drawing/2014/main" id="{8FF5C318-CDB9-5DFE-30CD-C910B4CFE71A}"/>
-              </a:ext>
-            </a:extLst>
-          </p:cNvPr>
-          <p:cNvGrpSpPr/>
-          <p:nvPr/>
-        </p:nvGrpSpPr>
-        <p:grpSpPr>
-          <a:xfrm>
-            <a:off x="7525975" y="-17625"/>
-            <a:ext cx="650584" cy="650584"/>
-            <a:chOff x="836706" y="1205325"/>
-            <a:chExt cx="1251218" cy="1251218"/>
-          </a:xfrm>
-        </p:grpSpPr>
-        <p:sp>
-          <p:nvSpPr>
-            <p:cNvPr id="34" name="Elipse 33">
-              <a:extLst>
-                <a:ext uri="{FF2B5EF4-FFF2-40B4-BE49-F238E27FC236}">
-                  <a16:creationId xmlns:a16="http://schemas.microsoft.com/office/drawing/2014/main" id="{79724435-EEC3-B039-1EC5-7C62B2676668}"/>
-                </a:ext>
-              </a:extLst>
-            </p:cNvPr>
-            <p:cNvSpPr/>
-            <p:nvPr/>
-          </p:nvSpPr>
-          <p:spPr>
-            <a:xfrm>
-              <a:off x="836706" y="1205325"/>
-              <a:ext cx="1251218" cy="1251218"/>
-            </a:xfrm>
-            <a:prstGeom prst="ellipse">
-              <a:avLst/>
-            </a:prstGeom>
-          </p:spPr>
-          <p:style>
-            <a:lnRef idx="2">
-              <a:schemeClr val="accent1">
-                <a:shade val="50000"/>
-              </a:schemeClr>
-            </a:lnRef>
-            <a:fillRef idx="1">
-              <a:schemeClr val="accent1"/>
-            </a:fillRef>
-            <a:effectRef idx="0">
-              <a:schemeClr val="accent1"/>
-            </a:effectRef>
-            <a:fontRef idx="minor">
-              <a:schemeClr val="lt1"/>
-            </a:fontRef>
-          </p:style>
-          <p:txBody>
-            <a:bodyPr rtlCol="0" anchor="ctr"/>
-            <a:lstStyle/>
-            <a:p>
-              <a:pPr algn="r"/>
-              <a:endParaRPr lang="pt-BR" dirty="0"/>
-            </a:p>
-          </p:txBody>
-        </p:sp>
-        <p:pic>
-          <p:nvPicPr>
-            <p:cNvPr id="36" name="Gráfico 35" descr="Homem usando um moletom">
-              <a:extLst>
-                <a:ext uri="{FF2B5EF4-FFF2-40B4-BE49-F238E27FC236}">
-                  <a16:creationId xmlns:a16="http://schemas.microsoft.com/office/drawing/2014/main" id="{DFA172EC-BB8A-B46C-66D4-F09D700A2EF0}"/>
-                </a:ext>
-              </a:extLst>
-            </p:cNvPr>
-            <p:cNvPicPr>
-              <a:picLocks noChangeAspect="1"/>
-            </p:cNvPicPr>
-            <p:nvPr/>
-          </p:nvPicPr>
-          <p:blipFill>
-            <a:blip r:embed="rId6">
-              <a:extLst>
-                <a:ext uri="{28A0092B-C50C-407E-A947-70E740481C1C}">
-                  <a14:useLocalDpi xmlns:a14="http://schemas.microsoft.com/office/drawing/2010/main" val="0"/>
-                </a:ext>
-                <a:ext uri="{96DAC541-7B7A-43D3-8B79-37D633B846F1}">
-                  <asvg:svgBlip xmlns:asvg="http://schemas.microsoft.com/office/drawing/2016/SVG/main" r:embed="rId7"/>
-                </a:ext>
-              </a:extLst>
-            </a:blip>
-            <a:stretch>
-              <a:fillRect/>
-            </a:stretch>
-          </p:blipFill>
-          <p:spPr>
-            <a:xfrm>
-              <a:off x="1074059" y="1302613"/>
-              <a:ext cx="783774" cy="1056642"/>
-            </a:xfrm>
-            <a:prstGeom prst="rect">
-              <a:avLst/>
-            </a:prstGeom>
-          </p:spPr>
-        </p:pic>
-      </p:grpSp>
-      <p:pic>
-        <p:nvPicPr>
-          <p:cNvPr id="37" name="Gráfico 36" descr="Renovação (Casa com faíscas) com preenchimento sólido">
-            <a:extLst>
-              <a:ext uri="{FF2B5EF4-FFF2-40B4-BE49-F238E27FC236}">
-                <a16:creationId xmlns:a16="http://schemas.microsoft.com/office/drawing/2014/main" id="{6094182B-C294-C364-C530-A80A3829746D}"/>
-              </a:ext>
-            </a:extLst>
-          </p:cNvPr>
-          <p:cNvPicPr>
-            <a:picLocks noChangeAspect="1"/>
-          </p:cNvPicPr>
-          <p:nvPr/>
-        </p:nvPicPr>
-        <p:blipFill>
-          <a:blip r:embed="rId2">
-            <a:extLst>
-              <a:ext uri="{28A0092B-C50C-407E-A947-70E740481C1C}">
-                <a14:useLocalDpi xmlns:a14="http://schemas.microsoft.com/office/drawing/2010/main" val="0"/>
-              </a:ext>
-              <a:ext uri="{96DAC541-7B7A-43D3-8B79-37D633B846F1}">
-                <asvg:svgBlip xmlns:asvg="http://schemas.microsoft.com/office/drawing/2016/SVG/main" r:embed="rId3"/>
-              </a:ext>
-            </a:extLst>
-          </a:blip>
-          <a:stretch>
-            <a:fillRect/>
-          </a:stretch>
-        </p:blipFill>
-        <p:spPr>
-          <a:xfrm>
-            <a:off x="11472476" y="139168"/>
-            <a:ext cx="428172" cy="428172"/>
-          </a:xfrm>
-          <a:prstGeom prst="rect">
-            <a:avLst/>
-          </a:prstGeom>
-        </p:spPr>
-      </p:pic>
-      <p:sp>
-        <p:nvSpPr>
-          <p:cNvPr id="20" name="Retângulo 19">
-            <a:extLst>
-              <a:ext uri="{FF2B5EF4-FFF2-40B4-BE49-F238E27FC236}">
-                <a16:creationId xmlns:a16="http://schemas.microsoft.com/office/drawing/2014/main" id="{200C0CDE-F38C-3A7A-CF3D-97809641C879}"/>
-              </a:ext>
-            </a:extLst>
-          </p:cNvPr>
-          <p:cNvSpPr/>
-          <p:nvPr/>
-        </p:nvSpPr>
-        <p:spPr>
-          <a:xfrm>
-            <a:off x="4559193" y="2429865"/>
-            <a:ext cx="1094028" cy="1415994"/>
-          </a:xfrm>
-          <a:prstGeom prst="rect">
-            <a:avLst/>
-          </a:prstGeom>
-          <a:solidFill>
-            <a:schemeClr val="bg1"/>
-          </a:solidFill>
-        </p:spPr>
-        <p:style>
-          <a:lnRef idx="1">
-            <a:schemeClr val="accent3"/>
-          </a:lnRef>
-          <a:fillRef idx="2">
-            <a:schemeClr val="accent3"/>
-          </a:fillRef>
-          <a:effectRef idx="1">
-            <a:schemeClr val="accent3"/>
-          </a:effectRef>
-          <a:fontRef idx="minor">
-            <a:schemeClr val="dk1"/>
-          </a:fontRef>
-        </p:style>
-        <p:txBody>
-          <a:bodyPr rtlCol="0" anchor="ctr"/>
-          <a:lstStyle/>
-          <a:p>
-            <a:pPr algn="l"/>
-            <a:r>
-              <a:rPr lang="pt-BR" b="1" i="0" dirty="0">
-                <a:solidFill>
-                  <a:srgbClr val="000000"/>
-                </a:solidFill>
-                <a:effectLst/>
-                <a:latin typeface="Times New Roman" panose="02020603050405020304" pitchFamily="18" charset="0"/>
-              </a:rPr>
-              <a:t>Editar</a:t>
-            </a:r>
-          </a:p>
-        </p:txBody>
-      </p:sp>
     </p:spTree>
     <p:extLst>
       <p:ext uri="{BB962C8B-B14F-4D97-AF65-F5344CB8AC3E}">

</xml_diff>